<commit_message>
Added aufgabenstellung. Updated the presentation and the cover page
</commit_message>
<xml_diff>
--- a/presentations/ziel_der_arbeit_vw.pptx
+++ b/presentations/ziel_der_arbeit_vw.pptx
@@ -5,22 +5,24 @@
     <p:sldMasterId id="2147483648" r:id="rId1"/>
   </p:sldMasterIdLst>
   <p:notesMasterIdLst>
-    <p:notesMasterId r:id="rId15"/>
+    <p:notesMasterId r:id="rId17"/>
   </p:notesMasterIdLst>
   <p:sldIdLst>
     <p:sldId id="444" r:id="rId2"/>
     <p:sldId id="445" r:id="rId3"/>
     <p:sldId id="446" r:id="rId4"/>
-    <p:sldId id="447" r:id="rId5"/>
-    <p:sldId id="448" r:id="rId6"/>
-    <p:sldId id="449" r:id="rId7"/>
-    <p:sldId id="450" r:id="rId8"/>
-    <p:sldId id="451" r:id="rId9"/>
-    <p:sldId id="456" r:id="rId10"/>
-    <p:sldId id="452" r:id="rId11"/>
-    <p:sldId id="455" r:id="rId12"/>
-    <p:sldId id="453" r:id="rId13"/>
-    <p:sldId id="454" r:id="rId14"/>
+    <p:sldId id="457" r:id="rId5"/>
+    <p:sldId id="458" r:id="rId6"/>
+    <p:sldId id="447" r:id="rId7"/>
+    <p:sldId id="448" r:id="rId8"/>
+    <p:sldId id="449" r:id="rId9"/>
+    <p:sldId id="450" r:id="rId10"/>
+    <p:sldId id="451" r:id="rId11"/>
+    <p:sldId id="456" r:id="rId12"/>
+    <p:sldId id="452" r:id="rId13"/>
+    <p:sldId id="455" r:id="rId14"/>
+    <p:sldId id="453" r:id="rId15"/>
+    <p:sldId id="454" r:id="rId16"/>
   </p:sldIdLst>
   <p:sldSz cx="9144000" cy="6858000" type="screen4x3"/>
   <p:notesSz cx="6797675" cy="9928225"/>
@@ -151,7 +153,7 @@
   </p:defaultTextStyle>
   <p:extLst>
     <p:ext uri="{EFAFB233-063F-42B5-8137-9DF3F51BA10A}">
-      <p15:sldGuideLst xmlns="" xmlns:p15="http://schemas.microsoft.com/office/powerpoint/2012/main">
+      <p15:sldGuideLst xmlns:p15="http://schemas.microsoft.com/office/powerpoint/2012/main" xmlns="">
         <p15:guide id="1" orient="horz" pos="595">
           <p15:clr>
             <a:srgbClr val="A4A3A4"/>
@@ -205,7 +207,7 @@
       </p15:sldGuideLst>
     </p:ext>
     <p:ext uri="{2D200454-40CA-4A62-9FC3-DE9A4176ACB9}">
-      <p15:notesGuideLst xmlns="" xmlns:p15="http://schemas.microsoft.com/office/powerpoint/2012/main">
+      <p15:notesGuideLst xmlns:p15="http://schemas.microsoft.com/office/powerpoint/2012/main" xmlns="">
         <p15:guide id="1" orient="horz" pos="3127">
           <p15:clr>
             <a:srgbClr val="A4A3A4"/>
@@ -943,6 +945,104 @@
 </p:notes>
 </file>
 
+<file path=ppt/notesSlides/notesSlide3.xml><?xml version="1.0" encoding="utf-8"?>
+<p:notes xmlns:a="http://schemas.openxmlformats.org/drawingml/2006/main" xmlns:r="http://schemas.openxmlformats.org/officeDocument/2006/relationships" xmlns:p="http://schemas.openxmlformats.org/presentationml/2006/main">
+  <p:cSld>
+    <p:spTree>
+      <p:nvGrpSpPr>
+        <p:cNvPr id="1" name=""/>
+        <p:cNvGrpSpPr/>
+        <p:nvPr/>
+      </p:nvGrpSpPr>
+      <p:grpSpPr>
+        <a:xfrm>
+          <a:off x="0" y="0"/>
+          <a:ext cx="0" cy="0"/>
+          <a:chOff x="0" y="0"/>
+          <a:chExt cx="0" cy="0"/>
+        </a:xfrm>
+      </p:grpSpPr>
+      <p:sp>
+        <p:nvSpPr>
+          <p:cNvPr id="2" name="Slide Image Placeholder 1"/>
+          <p:cNvSpPr>
+            <a:spLocks noGrp="1" noRot="1" noChangeAspect="1"/>
+          </p:cNvSpPr>
+          <p:nvPr>
+            <p:ph type="sldImg"/>
+          </p:nvPr>
+        </p:nvSpPr>
+        <p:spPr/>
+      </p:sp>
+      <p:sp>
+        <p:nvSpPr>
+          <p:cNvPr id="3" name="Notes Placeholder 2"/>
+          <p:cNvSpPr>
+            <a:spLocks noGrp="1"/>
+          </p:cNvSpPr>
+          <p:nvPr>
+            <p:ph type="body" idx="1"/>
+          </p:nvPr>
+        </p:nvSpPr>
+        <p:spPr/>
+        <p:txBody>
+          <a:bodyPr/>
+          <a:lstStyle/>
+          <a:p>
+            <a:r>
+              <a:rPr lang="en-US" dirty="0" smtClean="0"/>
+              <a:t>lambda = film thickness over</a:t>
+            </a:r>
+            <a:r>
+              <a:rPr lang="en-US" baseline="0" dirty="0" smtClean="0"/>
+              <a:t> the height of the surface. The higher is, the better the lubrication</a:t>
+            </a:r>
+            <a:endParaRPr lang="de-DE" dirty="0"/>
+          </a:p>
+        </p:txBody>
+      </p:sp>
+      <p:sp>
+        <p:nvSpPr>
+          <p:cNvPr id="4" name="Slide Number Placeholder 3"/>
+          <p:cNvSpPr>
+            <a:spLocks noGrp="1"/>
+          </p:cNvSpPr>
+          <p:nvPr>
+            <p:ph type="sldNum" sz="quarter" idx="10"/>
+          </p:nvPr>
+        </p:nvSpPr>
+        <p:spPr/>
+        <p:txBody>
+          <a:bodyPr/>
+          <a:lstStyle/>
+          <a:p>
+            <a:pPr>
+              <a:defRPr/>
+            </a:pPr>
+            <a:fld id="{B041C592-0D9F-4B01-86F7-CDFD027E03F2}" type="slidenum">
+              <a:rPr lang="de-DE" smtClean="0"/>
+              <a:pPr>
+                <a:defRPr/>
+              </a:pPr>
+              <a:t>4</a:t>
+            </a:fld>
+            <a:endParaRPr lang="de-DE"/>
+          </a:p>
+        </p:txBody>
+      </p:sp>
+    </p:spTree>
+    <p:extLst>
+      <p:ext uri="{BB962C8B-B14F-4D97-AF65-F5344CB8AC3E}">
+        <p14:creationId xmlns:p14="http://schemas.microsoft.com/office/powerpoint/2010/main" val="1602502217"/>
+      </p:ext>
+    </p:extLst>
+  </p:cSld>
+  <p:clrMapOvr>
+    <a:masterClrMapping/>
+  </p:clrMapOvr>
+</p:notes>
+</file>
+
 <file path=ppt/slideLayouts/slideLayout1.xml><?xml version="1.0" encoding="utf-8"?>
 <p:sldLayout xmlns:a="http://schemas.openxmlformats.org/drawingml/2006/main" xmlns:r="http://schemas.openxmlformats.org/officeDocument/2006/relationships" xmlns:p="http://schemas.openxmlformats.org/presentationml/2006/main" preserve="1" userDrawn="1">
   <p:cSld name="Titellayout">
@@ -1634,7 +1734,7 @@
           <a:p>
             <a:fld id="{1115177A-7322-4D6B-8FDA-6F20E91D0809}" type="datetimeFigureOut">
               <a:rPr lang="de-DE" smtClean="0"/>
-              <a:t>03.11.2017</a:t>
+              <a:t>07.11.2017</a:t>
             </a:fld>
             <a:endParaRPr lang="de-DE"/>
           </a:p>
@@ -1843,7 +1943,7 @@
           <a:p>
             <a:fld id="{1115177A-7322-4D6B-8FDA-6F20E91D0809}" type="datetimeFigureOut">
               <a:rPr lang="de-DE" smtClean="0"/>
-              <a:t>03.11.2017</a:t>
+              <a:t>07.11.2017</a:t>
             </a:fld>
             <a:endParaRPr lang="de-DE"/>
           </a:p>
@@ -2308,7 +2408,7 @@
           <a:p>
             <a:fld id="{1115177A-7322-4D6B-8FDA-6F20E91D0809}" type="datetimeFigureOut">
               <a:rPr lang="de-DE" smtClean="0"/>
-              <a:t>03.11.2017</a:t>
+              <a:t>07.11.2017</a:t>
             </a:fld>
             <a:endParaRPr lang="de-DE"/>
           </a:p>
@@ -3740,37 +3840,12 @@
         </p:nvSpPr>
         <p:spPr/>
         <p:txBody>
-          <a:bodyPr>
-            <a:normAutofit/>
-          </a:bodyPr>
-          <a:lstStyle/>
-          <a:p>
-            <a:r>
-              <a:rPr lang="de-DE" dirty="0" smtClean="0"/>
-              <a:t>Optisch vs elektrisch</a:t>
-            </a:r>
-            <a:endParaRPr lang="de-DE" dirty="0"/>
-          </a:p>
-        </p:txBody>
-      </p:sp>
-      <p:sp>
-        <p:nvSpPr>
-          <p:cNvPr id="7" name="Text Placeholder 6"/>
-          <p:cNvSpPr>
-            <a:spLocks noGrp="1"/>
-          </p:cNvSpPr>
-          <p:nvPr>
-            <p:ph type="body" idx="1"/>
-          </p:nvPr>
-        </p:nvSpPr>
-        <p:spPr/>
-        <p:txBody>
           <a:bodyPr/>
           <a:lstStyle/>
           <a:p>
             <a:r>
               <a:rPr lang="de-DE" dirty="0" smtClean="0"/>
-              <a:t>Optisch</a:t>
+              <a:t>Ultraschall</a:t>
             </a:r>
             <a:endParaRPr lang="de-DE" dirty="0"/>
           </a:p>
@@ -3783,7 +3858,7 @@
             <a:spLocks noGrp="1"/>
           </p:cNvSpPr>
           <p:nvPr>
-            <p:ph sz="half" idx="2"/>
+            <p:ph idx="1"/>
           </p:nvPr>
         </p:nvSpPr>
         <p:spPr/>
@@ -3791,102 +3866,81 @@
           <a:bodyPr/>
           <a:lstStyle/>
           <a:p>
-            <a:r>
-              <a:rPr lang="de-DE" dirty="0" smtClean="0"/>
-              <a:t>Genauigkeit</a:t>
-            </a:r>
-          </a:p>
-          <a:p>
-            <a:r>
-              <a:rPr lang="de-DE" dirty="0" smtClean="0"/>
-              <a:t>Zuverlässigkeit</a:t>
-            </a:r>
-          </a:p>
-          <a:p>
+            <a:pPr marL="0" indent="0">
+              <a:buNone/>
+            </a:pPr>
             <a:endParaRPr lang="de-DE" dirty="0"/>
           </a:p>
-          <a:p>
-            <a:pPr>
-              <a:buFont typeface="Symbol" pitchFamily="18" charset="2"/>
-              <a:buChar char="-"/>
-            </a:pPr>
-            <a:r>
-              <a:rPr lang="de-DE" dirty="0" smtClean="0"/>
-              <a:t>Optischer Zugang nötig</a:t>
-            </a:r>
-            <a:endParaRPr lang="de-DE" dirty="0" smtClean="0"/>
-          </a:p>
-        </p:txBody>
-      </p:sp>
-      <p:sp>
-        <p:nvSpPr>
-          <p:cNvPr id="8" name="Text Placeholder 7"/>
-          <p:cNvSpPr>
-            <a:spLocks noGrp="1"/>
-          </p:cNvSpPr>
-          <p:nvPr>
-            <p:ph type="body" sz="quarter" idx="3"/>
-          </p:nvPr>
-        </p:nvSpPr>
-        <p:spPr/>
-        <p:txBody>
-          <a:bodyPr/>
-          <a:lstStyle/>
-          <a:p>
-            <a:r>
-              <a:rPr lang="de-DE" dirty="0" smtClean="0"/>
-              <a:t>Elektrisch (kapazitiv)</a:t>
-            </a:r>
-            <a:endParaRPr lang="de-DE" dirty="0"/>
-          </a:p>
-        </p:txBody>
-      </p:sp>
-      <p:sp>
-        <p:nvSpPr>
-          <p:cNvPr id="9" name="Content Placeholder 8"/>
-          <p:cNvSpPr>
-            <a:spLocks noGrp="1"/>
-          </p:cNvSpPr>
-          <p:nvPr>
-            <p:ph sz="quarter" idx="4"/>
-          </p:nvPr>
-        </p:nvSpPr>
-        <p:spPr/>
-        <p:txBody>
-          <a:bodyPr/>
-          <a:lstStyle/>
-          <a:p>
-            <a:r>
-              <a:rPr lang="de-DE" dirty="0" smtClean="0"/>
-              <a:t>Metall-Metall Kontakt</a:t>
-            </a:r>
-          </a:p>
-          <a:p>
-            <a:r>
-              <a:rPr lang="de-DE" dirty="0" smtClean="0"/>
-              <a:t>Einfacher Aufbau</a:t>
-            </a:r>
-          </a:p>
-          <a:p>
-            <a:endParaRPr lang="de-DE" dirty="0"/>
-          </a:p>
-          <a:p>
-            <a:pPr>
-              <a:buFont typeface="Symbol" pitchFamily="18" charset="2"/>
-              <a:buChar char="-"/>
-            </a:pPr>
-            <a:r>
-              <a:rPr lang="de-DE" dirty="0" smtClean="0"/>
-              <a:t>Parameterschwankung von verschiedenen Schmierungen</a:t>
-            </a:r>
-            <a:endParaRPr lang="de-DE" dirty="0"/>
-          </a:p>
-        </p:txBody>
-      </p:sp>
+        </p:txBody>
+      </p:sp>
+      <p:pic>
+        <p:nvPicPr>
+          <p:cNvPr id="6146" name="Picture 2"/>
+          <p:cNvPicPr>
+            <a:picLocks noChangeAspect="1" noChangeArrowheads="1"/>
+          </p:cNvPicPr>
+          <p:nvPr/>
+        </p:nvPicPr>
+        <p:blipFill>
+          <a:blip r:embed="rId2">
+            <a:extLst>
+              <a:ext uri="{28A0092B-C50C-407E-A947-70E740481C1C}">
+                <a14:useLocalDpi xmlns:a14="http://schemas.microsoft.com/office/drawing/2010/main" val="0"/>
+              </a:ext>
+            </a:extLst>
+          </a:blip>
+          <a:srcRect/>
+          <a:stretch>
+            <a:fillRect/>
+          </a:stretch>
+        </p:blipFill>
+        <p:spPr bwMode="auto">
+          <a:xfrm>
+            <a:off x="899592" y="1837792"/>
+            <a:ext cx="7525691" cy="4087738"/>
+          </a:xfrm>
+          <a:prstGeom prst="rect">
+            <a:avLst/>
+          </a:prstGeom>
+          <a:noFill/>
+          <a:ln>
+            <a:noFill/>
+          </a:ln>
+          <a:effectLst/>
+          <a:extLst>
+            <a:ext uri="{909E8E84-426E-40DD-AFC4-6F175D3DCCD1}">
+              <a14:hiddenFill xmlns:a14="http://schemas.microsoft.com/office/drawing/2010/main">
+                <a:solidFill>
+                  <a:schemeClr val="accent1"/>
+                </a:solidFill>
+              </a14:hiddenFill>
+            </a:ext>
+            <a:ext uri="{91240B29-F687-4F45-9708-019B960494DF}">
+              <a14:hiddenLine xmlns:a14="http://schemas.microsoft.com/office/drawing/2010/main" w="9525">
+                <a:solidFill>
+                  <a:schemeClr val="tx1"/>
+                </a:solidFill>
+                <a:miter lim="800000"/>
+                <a:headEnd/>
+                <a:tailEnd/>
+              </a14:hiddenLine>
+            </a:ext>
+            <a:ext uri="{AF507438-7753-43E0-B8FC-AC1667EBCBE1}">
+              <a14:hiddenEffects xmlns:a14="http://schemas.microsoft.com/office/drawing/2010/main">
+                <a:effectLst>
+                  <a:outerShdw dist="35921" dir="2700000" algn="ctr" rotWithShape="0">
+                    <a:schemeClr val="bg2"/>
+                  </a:outerShdw>
+                </a:effectLst>
+              </a14:hiddenEffects>
+            </a:ext>
+          </a:extLst>
+        </p:spPr>
+      </p:pic>
     </p:spTree>
     <p:extLst>
       <p:ext uri="{BB962C8B-B14F-4D97-AF65-F5344CB8AC3E}">
-        <p14:creationId xmlns:p14="http://schemas.microsoft.com/office/powerpoint/2010/main" val="1894591889"/>
+        <p14:creationId xmlns:p14="http://schemas.microsoft.com/office/powerpoint/2010/main" val="2544933492"/>
       </p:ext>
     </p:extLst>
   </p:cSld>
@@ -3922,6 +3976,453 @@
       </p:grpSpPr>
       <p:sp>
         <p:nvSpPr>
+          <p:cNvPr id="2" name="Title 1"/>
+          <p:cNvSpPr>
+            <a:spLocks noGrp="1"/>
+          </p:cNvSpPr>
+          <p:nvPr>
+            <p:ph type="title"/>
+          </p:nvPr>
+        </p:nvSpPr>
+        <p:spPr/>
+        <p:txBody>
+          <a:bodyPr/>
+          <a:lstStyle/>
+          <a:p>
+            <a:r>
+              <a:rPr lang="de-DE" dirty="0" smtClean="0"/>
+              <a:t>Laserinduzierte Fluoreszenz</a:t>
+            </a:r>
+            <a:endParaRPr lang="de-DE" dirty="0"/>
+          </a:p>
+        </p:txBody>
+      </p:sp>
+      <p:sp>
+        <p:nvSpPr>
+          <p:cNvPr id="3" name="Content Placeholder 2"/>
+          <p:cNvSpPr>
+            <a:spLocks noGrp="1"/>
+          </p:cNvSpPr>
+          <p:nvPr>
+            <p:ph idx="1"/>
+          </p:nvPr>
+        </p:nvSpPr>
+        <p:spPr/>
+        <p:txBody>
+          <a:bodyPr/>
+          <a:lstStyle/>
+          <a:p>
+            <a:endParaRPr lang="de-DE" dirty="0"/>
+          </a:p>
+        </p:txBody>
+      </p:sp>
+      <p:sp>
+        <p:nvSpPr>
+          <p:cNvPr id="4" name="Footer Placeholder 3"/>
+          <p:cNvSpPr>
+            <a:spLocks noGrp="1"/>
+          </p:cNvSpPr>
+          <p:nvPr>
+            <p:ph type="ftr" sz="quarter" idx="11"/>
+          </p:nvPr>
+        </p:nvSpPr>
+        <p:spPr/>
+        <p:txBody>
+          <a:bodyPr/>
+          <a:lstStyle/>
+          <a:p>
+            <a:endParaRPr lang="de-DE"/>
+          </a:p>
+        </p:txBody>
+      </p:sp>
+      <p:pic>
+        <p:nvPicPr>
+          <p:cNvPr id="1026" name="Picture 2"/>
+          <p:cNvPicPr>
+            <a:picLocks noChangeAspect="1" noChangeArrowheads="1"/>
+          </p:cNvPicPr>
+          <p:nvPr/>
+        </p:nvPicPr>
+        <p:blipFill>
+          <a:blip r:embed="rId2">
+            <a:extLst>
+              <a:ext uri="{28A0092B-C50C-407E-A947-70E740481C1C}">
+                <a14:useLocalDpi xmlns:a14="http://schemas.microsoft.com/office/drawing/2010/main" val="0"/>
+              </a:ext>
+            </a:extLst>
+          </a:blip>
+          <a:srcRect/>
+          <a:stretch>
+            <a:fillRect/>
+          </a:stretch>
+        </p:blipFill>
+        <p:spPr bwMode="auto">
+          <a:xfrm>
+            <a:off x="431540" y="2591193"/>
+            <a:ext cx="4751623" cy="2402283"/>
+          </a:xfrm>
+          <a:prstGeom prst="rect">
+            <a:avLst/>
+          </a:prstGeom>
+          <a:noFill/>
+          <a:ln>
+            <a:noFill/>
+          </a:ln>
+          <a:effectLst/>
+          <a:extLst>
+            <a:ext uri="{909E8E84-426E-40DD-AFC4-6F175D3DCCD1}">
+              <a14:hiddenFill xmlns:a14="http://schemas.microsoft.com/office/drawing/2010/main">
+                <a:solidFill>
+                  <a:schemeClr val="accent1"/>
+                </a:solidFill>
+              </a14:hiddenFill>
+            </a:ext>
+            <a:ext uri="{91240B29-F687-4F45-9708-019B960494DF}">
+              <a14:hiddenLine xmlns:a14="http://schemas.microsoft.com/office/drawing/2010/main" w="9525">
+                <a:solidFill>
+                  <a:schemeClr val="tx1"/>
+                </a:solidFill>
+                <a:miter lim="800000"/>
+                <a:headEnd/>
+                <a:tailEnd/>
+              </a14:hiddenLine>
+            </a:ext>
+            <a:ext uri="{AF507438-7753-43E0-B8FC-AC1667EBCBE1}">
+              <a14:hiddenEffects xmlns:a14="http://schemas.microsoft.com/office/drawing/2010/main">
+                <a:effectLst>
+                  <a:outerShdw dist="35921" dir="2700000" algn="ctr" rotWithShape="0">
+                    <a:schemeClr val="bg2"/>
+                  </a:outerShdw>
+                </a:effectLst>
+              </a14:hiddenEffects>
+            </a:ext>
+          </a:extLst>
+        </p:spPr>
+      </p:pic>
+      <p:pic>
+        <p:nvPicPr>
+          <p:cNvPr id="1027" name="Picture 3"/>
+          <p:cNvPicPr>
+            <a:picLocks noChangeAspect="1" noChangeArrowheads="1"/>
+          </p:cNvPicPr>
+          <p:nvPr/>
+        </p:nvPicPr>
+        <p:blipFill>
+          <a:blip r:embed="rId3">
+            <a:extLst>
+              <a:ext uri="{28A0092B-C50C-407E-A947-70E740481C1C}">
+                <a14:useLocalDpi xmlns:a14="http://schemas.microsoft.com/office/drawing/2010/main" val="0"/>
+              </a:ext>
+            </a:extLst>
+          </a:blip>
+          <a:srcRect/>
+          <a:stretch>
+            <a:fillRect/>
+          </a:stretch>
+        </p:blipFill>
+        <p:spPr bwMode="auto">
+          <a:xfrm>
+            <a:off x="5292080" y="2420888"/>
+            <a:ext cx="3742403" cy="3009516"/>
+          </a:xfrm>
+          <a:prstGeom prst="rect">
+            <a:avLst/>
+          </a:prstGeom>
+          <a:noFill/>
+          <a:ln>
+            <a:noFill/>
+          </a:ln>
+          <a:effectLst/>
+          <a:extLst>
+            <a:ext uri="{909E8E84-426E-40DD-AFC4-6F175D3DCCD1}">
+              <a14:hiddenFill xmlns:a14="http://schemas.microsoft.com/office/drawing/2010/main">
+                <a:solidFill>
+                  <a:schemeClr val="accent1"/>
+                </a:solidFill>
+              </a14:hiddenFill>
+            </a:ext>
+            <a:ext uri="{91240B29-F687-4F45-9708-019B960494DF}">
+              <a14:hiddenLine xmlns:a14="http://schemas.microsoft.com/office/drawing/2010/main" w="9525">
+                <a:solidFill>
+                  <a:schemeClr val="tx1"/>
+                </a:solidFill>
+                <a:miter lim="800000"/>
+                <a:headEnd/>
+                <a:tailEnd/>
+              </a14:hiddenLine>
+            </a:ext>
+            <a:ext uri="{AF507438-7753-43E0-B8FC-AC1667EBCBE1}">
+              <a14:hiddenEffects xmlns:a14="http://schemas.microsoft.com/office/drawing/2010/main">
+                <a:effectLst>
+                  <a:outerShdw dist="35921" dir="2700000" algn="ctr" rotWithShape="0">
+                    <a:schemeClr val="bg2"/>
+                  </a:outerShdw>
+                </a:effectLst>
+              </a14:hiddenEffects>
+            </a:ext>
+          </a:extLst>
+        </p:spPr>
+      </p:pic>
+      <p:sp>
+        <p:nvSpPr>
+          <p:cNvPr id="5" name="TextBox 4"/>
+          <p:cNvSpPr txBox="1"/>
+          <p:nvPr/>
+        </p:nvSpPr>
+        <p:spPr>
+          <a:xfrm>
+            <a:off x="899592" y="3453780"/>
+            <a:ext cx="697627" cy="338554"/>
+          </a:xfrm>
+          <a:prstGeom prst="rect">
+            <a:avLst/>
+          </a:prstGeom>
+          <a:noFill/>
+        </p:spPr>
+        <p:txBody>
+          <a:bodyPr wrap="none" rtlCol="0">
+            <a:spAutoFit/>
+          </a:bodyPr>
+          <a:lstStyle/>
+          <a:p>
+            <a:r>
+              <a:rPr lang="de-DE" sz="1600" dirty="0" smtClean="0"/>
+              <a:t>Laser</a:t>
+            </a:r>
+            <a:endParaRPr lang="de-DE" sz="1600" dirty="0"/>
+          </a:p>
+        </p:txBody>
+      </p:sp>
+    </p:spTree>
+    <p:extLst>
+      <p:ext uri="{BB962C8B-B14F-4D97-AF65-F5344CB8AC3E}">
+        <p14:creationId xmlns:p14="http://schemas.microsoft.com/office/powerpoint/2010/main" val="1283500121"/>
+      </p:ext>
+    </p:extLst>
+  </p:cSld>
+  <p:clrMapOvr>
+    <a:masterClrMapping/>
+  </p:clrMapOvr>
+  <p:timing>
+    <p:tnLst>
+      <p:par>
+        <p:cTn id="1" dur="indefinite" restart="never" nodeType="tmRoot"/>
+      </p:par>
+    </p:tnLst>
+  </p:timing>
+</p:sld>
+</file>
+
+<file path=ppt/slides/slide12.xml><?xml version="1.0" encoding="utf-8"?>
+<p:sld xmlns:a="http://schemas.openxmlformats.org/drawingml/2006/main" xmlns:r="http://schemas.openxmlformats.org/officeDocument/2006/relationships" xmlns:p="http://schemas.openxmlformats.org/presentationml/2006/main">
+  <p:cSld>
+    <p:spTree>
+      <p:nvGrpSpPr>
+        <p:cNvPr id="1" name=""/>
+        <p:cNvGrpSpPr/>
+        <p:nvPr/>
+      </p:nvGrpSpPr>
+      <p:grpSpPr>
+        <a:xfrm>
+          <a:off x="0" y="0"/>
+          <a:ext cx="0" cy="0"/>
+          <a:chOff x="0" y="0"/>
+          <a:chExt cx="0" cy="0"/>
+        </a:xfrm>
+      </p:grpSpPr>
+      <p:sp>
+        <p:nvSpPr>
+          <p:cNvPr id="2" name="Title 1"/>
+          <p:cNvSpPr>
+            <a:spLocks noGrp="1"/>
+          </p:cNvSpPr>
+          <p:nvPr>
+            <p:ph type="title"/>
+          </p:nvPr>
+        </p:nvSpPr>
+        <p:spPr/>
+        <p:txBody>
+          <a:bodyPr>
+            <a:normAutofit/>
+          </a:bodyPr>
+          <a:lstStyle/>
+          <a:p>
+            <a:r>
+              <a:rPr lang="de-DE" dirty="0" smtClean="0"/>
+              <a:t>Optisch vs elektrisch</a:t>
+            </a:r>
+            <a:endParaRPr lang="de-DE" dirty="0"/>
+          </a:p>
+        </p:txBody>
+      </p:sp>
+      <p:sp>
+        <p:nvSpPr>
+          <p:cNvPr id="7" name="Text Placeholder 6"/>
+          <p:cNvSpPr>
+            <a:spLocks noGrp="1"/>
+          </p:cNvSpPr>
+          <p:nvPr>
+            <p:ph type="body" idx="1"/>
+          </p:nvPr>
+        </p:nvSpPr>
+        <p:spPr/>
+        <p:txBody>
+          <a:bodyPr/>
+          <a:lstStyle/>
+          <a:p>
+            <a:r>
+              <a:rPr lang="de-DE" dirty="0" smtClean="0"/>
+              <a:t>Optisch</a:t>
+            </a:r>
+            <a:endParaRPr lang="de-DE" dirty="0"/>
+          </a:p>
+        </p:txBody>
+      </p:sp>
+      <p:sp>
+        <p:nvSpPr>
+          <p:cNvPr id="3" name="Content Placeholder 2"/>
+          <p:cNvSpPr>
+            <a:spLocks noGrp="1"/>
+          </p:cNvSpPr>
+          <p:nvPr>
+            <p:ph sz="half" idx="2"/>
+          </p:nvPr>
+        </p:nvSpPr>
+        <p:spPr/>
+        <p:txBody>
+          <a:bodyPr/>
+          <a:lstStyle/>
+          <a:p>
+            <a:r>
+              <a:rPr lang="de-DE" dirty="0" smtClean="0"/>
+              <a:t>Genauigkeit</a:t>
+            </a:r>
+          </a:p>
+          <a:p>
+            <a:r>
+              <a:rPr lang="de-DE" dirty="0" smtClean="0"/>
+              <a:t>Zuverlässigkeit</a:t>
+            </a:r>
+          </a:p>
+          <a:p>
+            <a:endParaRPr lang="de-DE" dirty="0"/>
+          </a:p>
+          <a:p>
+            <a:pPr>
+              <a:buFont typeface="Symbol" pitchFamily="18" charset="2"/>
+              <a:buChar char="-"/>
+            </a:pPr>
+            <a:r>
+              <a:rPr lang="de-DE" dirty="0" smtClean="0"/>
+              <a:t>Optischer Zugang nötig</a:t>
+            </a:r>
+          </a:p>
+        </p:txBody>
+      </p:sp>
+      <p:sp>
+        <p:nvSpPr>
+          <p:cNvPr id="8" name="Text Placeholder 7"/>
+          <p:cNvSpPr>
+            <a:spLocks noGrp="1"/>
+          </p:cNvSpPr>
+          <p:nvPr>
+            <p:ph type="body" sz="quarter" idx="3"/>
+          </p:nvPr>
+        </p:nvSpPr>
+        <p:spPr/>
+        <p:txBody>
+          <a:bodyPr/>
+          <a:lstStyle/>
+          <a:p>
+            <a:r>
+              <a:rPr lang="de-DE" dirty="0" smtClean="0"/>
+              <a:t>Elektrisch (kapazitiv)</a:t>
+            </a:r>
+            <a:endParaRPr lang="de-DE" dirty="0"/>
+          </a:p>
+        </p:txBody>
+      </p:sp>
+      <p:sp>
+        <p:nvSpPr>
+          <p:cNvPr id="9" name="Content Placeholder 8"/>
+          <p:cNvSpPr>
+            <a:spLocks noGrp="1"/>
+          </p:cNvSpPr>
+          <p:nvPr>
+            <p:ph sz="quarter" idx="4"/>
+          </p:nvPr>
+        </p:nvSpPr>
+        <p:spPr/>
+        <p:txBody>
+          <a:bodyPr/>
+          <a:lstStyle/>
+          <a:p>
+            <a:r>
+              <a:rPr lang="de-DE" dirty="0" smtClean="0"/>
+              <a:t>Metall-Metall Kontakt</a:t>
+            </a:r>
+          </a:p>
+          <a:p>
+            <a:r>
+              <a:rPr lang="de-DE" dirty="0" smtClean="0"/>
+              <a:t>Einfacher Aufbau</a:t>
+            </a:r>
+          </a:p>
+          <a:p>
+            <a:endParaRPr lang="de-DE" dirty="0"/>
+          </a:p>
+          <a:p>
+            <a:pPr>
+              <a:buFont typeface="Symbol" pitchFamily="18" charset="2"/>
+              <a:buChar char="-"/>
+            </a:pPr>
+            <a:r>
+              <a:rPr lang="de-DE" dirty="0" smtClean="0"/>
+              <a:t>Parameterschwankung von verschiedenen Schmierungen</a:t>
+            </a:r>
+            <a:endParaRPr lang="de-DE" dirty="0"/>
+          </a:p>
+        </p:txBody>
+      </p:sp>
+    </p:spTree>
+    <p:extLst>
+      <p:ext uri="{BB962C8B-B14F-4D97-AF65-F5344CB8AC3E}">
+        <p14:creationId xmlns:p14="http://schemas.microsoft.com/office/powerpoint/2010/main" val="1894591889"/>
+      </p:ext>
+    </p:extLst>
+  </p:cSld>
+  <p:clrMapOvr>
+    <a:masterClrMapping/>
+  </p:clrMapOvr>
+  <p:timing>
+    <p:tnLst>
+      <p:par>
+        <p:cTn id="1" dur="indefinite" restart="never" nodeType="tmRoot"/>
+      </p:par>
+    </p:tnLst>
+  </p:timing>
+</p:sld>
+</file>
+
+<file path=ppt/slides/slide13.xml><?xml version="1.0" encoding="utf-8"?>
+<p:sld xmlns:a="http://schemas.openxmlformats.org/drawingml/2006/main" xmlns:r="http://schemas.openxmlformats.org/officeDocument/2006/relationships" xmlns:p="http://schemas.openxmlformats.org/presentationml/2006/main">
+  <p:cSld>
+    <p:spTree>
+      <p:nvGrpSpPr>
+        <p:cNvPr id="1" name=""/>
+        <p:cNvGrpSpPr/>
+        <p:nvPr/>
+      </p:nvGrpSpPr>
+      <p:grpSpPr>
+        <a:xfrm>
+          <a:off x="0" y="0"/>
+          <a:ext cx="0" cy="0"/>
+          <a:chOff x="0" y="0"/>
+          <a:chExt cx="0" cy="0"/>
+        </a:xfrm>
+      </p:grpSpPr>
+      <p:sp>
+        <p:nvSpPr>
           <p:cNvPr id="8" name="Title 7"/>
           <p:cNvSpPr>
             <a:spLocks noGrp="1"/>
@@ -4017,7 +4518,7 @@
 </p:sld>
 </file>
 
-<file path=ppt/slides/slide12.xml><?xml version="1.0" encoding="utf-8"?>
+<file path=ppt/slides/slide14.xml><?xml version="1.0" encoding="utf-8"?>
 <p:sld xmlns:a="http://schemas.openxmlformats.org/drawingml/2006/main" xmlns:r="http://schemas.openxmlformats.org/officeDocument/2006/relationships" xmlns:p="http://schemas.openxmlformats.org/presentationml/2006/main">
   <p:cSld>
     <p:spTree>
@@ -4193,7 +4694,7 @@
 </p:sld>
 </file>
 
-<file path=ppt/slides/slide13.xml><?xml version="1.0" encoding="utf-8"?>
+<file path=ppt/slides/slide15.xml><?xml version="1.0" encoding="utf-8"?>
 <p:sld xmlns:a="http://schemas.openxmlformats.org/drawingml/2006/main" xmlns:r="http://schemas.openxmlformats.org/officeDocument/2006/relationships" xmlns:p="http://schemas.openxmlformats.org/presentationml/2006/main">
   <p:cSld>
     <p:spTree>
@@ -4210,6 +4711,73 @@
           <a:chExt cx="0" cy="0"/>
         </a:xfrm>
       </p:grpSpPr>
+      <p:sp>
+        <p:nvSpPr>
+          <p:cNvPr id="8" name="Rectangle 7"/>
+          <p:cNvSpPr/>
+          <p:nvPr/>
+        </p:nvSpPr>
+        <p:spPr bwMode="auto">
+          <a:xfrm>
+            <a:off x="2699792" y="1268759"/>
+            <a:ext cx="3708412" cy="461665"/>
+          </a:xfrm>
+          <a:prstGeom prst="rect">
+            <a:avLst/>
+          </a:prstGeom>
+          <a:solidFill>
+            <a:srgbClr val="FFFF00"/>
+          </a:solidFill>
+          <a:ln w="9525" cap="flat" cmpd="sng" algn="ctr">
+            <a:solidFill>
+              <a:schemeClr val="tx1"/>
+            </a:solidFill>
+            <a:prstDash val="solid"/>
+            <a:round/>
+            <a:headEnd type="none" w="med" len="med"/>
+            <a:tailEnd type="none" w="med" len="med"/>
+          </a:ln>
+          <a:effectLst/>
+          <a:extLst/>
+        </p:spPr>
+        <p:txBody>
+          <a:bodyPr vert="horz" wrap="square" lIns="91440" tIns="45720" rIns="91440" bIns="45720" numCol="1" rtlCol="0" anchor="t" anchorCtr="0" compatLnSpc="1">
+            <a:prstTxWarp prst="textNoShape">
+              <a:avLst/>
+            </a:prstTxWarp>
+          </a:bodyPr>
+          <a:lstStyle/>
+          <a:p>
+            <a:pPr marL="0" marR="0" indent="0" algn="l" defTabSz="914400" rtl="0" eaLnBrk="0" fontAlgn="base" latinLnBrk="0" hangingPunct="0">
+              <a:lnSpc>
+                <a:spcPct val="100000"/>
+              </a:lnSpc>
+              <a:spcBef>
+                <a:spcPct val="0"/>
+              </a:spcBef>
+              <a:spcAft>
+                <a:spcPct val="0"/>
+              </a:spcAft>
+              <a:buClrTx/>
+              <a:buSzTx/>
+              <a:buFontTx/>
+              <a:buNone/>
+              <a:tabLst/>
+            </a:pPr>
+            <a:endParaRPr kumimoji="0" lang="de-DE" sz="2400" b="0" i="0" u="none" strike="noStrike" cap="none" normalizeH="0" baseline="0" smtClean="0">
+              <a:ln>
+                <a:noFill/>
+              </a:ln>
+              <a:solidFill>
+                <a:schemeClr val="tx1"/>
+              </a:solidFill>
+              <a:effectLst/>
+              <a:latin typeface="Arial" charset="0"/>
+              <a:ea typeface="ＭＳ Ｐゴシック" pitchFamily="1" charset="-128"/>
+            </a:endParaRPr>
+          </a:p>
+        </p:txBody>
+      </p:sp>
       <p:pic>
         <p:nvPicPr>
           <p:cNvPr id="8194" name="Picture 2"/>
@@ -4354,8 +4922,8 @@
           <a:lstStyle/>
           <a:p>
             <a:r>
-              <a:rPr lang="de-DE" dirty="0" smtClean="0"/>
-              <a:t>Wie?</a:t>
+              <a:rPr lang="en-US" dirty="0" err="1" smtClean="0"/>
+              <a:t>Voraussetzungen</a:t>
             </a:r>
             <a:endParaRPr lang="de-DE" dirty="0"/>
           </a:p>
@@ -4410,6 +4978,10 @@
             </a:r>
           </a:p>
           <a:p>
+            <a:pPr>
+              <a:buFont typeface="Symbol" pitchFamily="18" charset="2"/>
+              <a:buChar char="-"/>
+            </a:pPr>
             <a:r>
               <a:rPr lang="de-DE" dirty="0" smtClean="0"/>
               <a:t>Niedrige Auflösung</a:t>
@@ -4442,11 +5014,7 @@
           <a:p>
             <a:r>
               <a:rPr lang="de-DE" sz="2000" dirty="0" smtClean="0"/>
-              <a:t>Spacer-Scheibe </a:t>
-            </a:r>
-            <a:r>
-              <a:rPr lang="de-DE" sz="2000" dirty="0" smtClean="0"/>
-              <a:t>+ Beschichtung</a:t>
+              <a:t>Spacer-Scheibe + Beschichtung</a:t>
             </a:r>
             <a:endParaRPr lang="de-DE" sz="2000" dirty="0"/>
           </a:p>
@@ -4478,15 +5046,79 @@
             </a:r>
           </a:p>
           <a:p>
+            <a:pPr>
+              <a:buFont typeface="Symbol" pitchFamily="18" charset="2"/>
+              <a:buChar char="-"/>
+            </a:pPr>
             <a:r>
               <a:rPr lang="de-DE" dirty="0" smtClean="0"/>
               <a:t>Dicke die Beschichtung</a:t>
             </a:r>
           </a:p>
           <a:p>
+            <a:pPr>
+              <a:buFont typeface="Symbol" pitchFamily="18" charset="2"/>
+              <a:buChar char="-"/>
+            </a:pPr>
             <a:r>
               <a:rPr lang="de-DE" dirty="0" smtClean="0"/>
-              <a:t>Kugel über die Kante</a:t>
+              <a:t>Kugel über die </a:t>
+            </a:r>
+            <a:r>
+              <a:rPr lang="de-DE" dirty="0" smtClean="0"/>
+              <a:t>Kante</a:t>
+            </a:r>
+          </a:p>
+          <a:p>
+            <a:pPr>
+              <a:buFont typeface="Symbol" pitchFamily="18" charset="2"/>
+              <a:buChar char="-"/>
+            </a:pPr>
+            <a:r>
+              <a:rPr lang="en-US" dirty="0" smtClean="0"/>
+              <a:t>Timing der </a:t>
+            </a:r>
+            <a:r>
+              <a:rPr lang="en-US" dirty="0" err="1" smtClean="0"/>
+              <a:t>Messung</a:t>
+            </a:r>
+            <a:endParaRPr lang="de-DE" dirty="0"/>
+          </a:p>
+        </p:txBody>
+      </p:sp>
+      <p:sp>
+        <p:nvSpPr>
+          <p:cNvPr id="3" name="TextBox 2"/>
+          <p:cNvSpPr txBox="1"/>
+          <p:nvPr/>
+        </p:nvSpPr>
+        <p:spPr>
+          <a:xfrm>
+            <a:off x="2715041" y="1273931"/>
+            <a:ext cx="4098413" cy="461665"/>
+          </a:xfrm>
+          <a:prstGeom prst="rect">
+            <a:avLst/>
+          </a:prstGeom>
+          <a:noFill/>
+        </p:spPr>
+        <p:txBody>
+          <a:bodyPr wrap="square" rtlCol="0">
+            <a:spAutoFit/>
+          </a:bodyPr>
+          <a:lstStyle/>
+          <a:p>
+            <a:r>
+              <a:rPr lang="en-US" dirty="0" err="1" smtClean="0"/>
+              <a:t>Isolierung</a:t>
+            </a:r>
+            <a:r>
+              <a:rPr lang="en-US" dirty="0" smtClean="0"/>
+              <a:t> des </a:t>
+            </a:r>
+            <a:r>
+              <a:rPr lang="de-DE" dirty="0" smtClean="0"/>
+              <a:t>Strompfads</a:t>
             </a:r>
             <a:endParaRPr lang="de-DE" dirty="0"/>
           </a:p>
@@ -4576,11 +5208,7 @@
           <a:p>
             <a:r>
               <a:rPr lang="de-DE" dirty="0" smtClean="0"/>
-              <a:t>Messung </a:t>
-            </a:r>
-            <a:r>
-              <a:rPr lang="de-DE" dirty="0" smtClean="0"/>
-              <a:t>der Filmdicke</a:t>
+              <a:t>Messung der Filmdicke</a:t>
             </a:r>
           </a:p>
           <a:p>
@@ -4658,8 +5286,8 @@
         </p:blipFill>
         <p:spPr bwMode="auto">
           <a:xfrm>
-            <a:off x="3671900" y="1398218"/>
-            <a:ext cx="5697755" cy="4609505"/>
+            <a:off x="3662164" y="1340768"/>
+            <a:ext cx="5472100" cy="4426949"/>
           </a:xfrm>
           <a:prstGeom prst="rect">
             <a:avLst/>
@@ -4860,6 +5488,498 @@
         </p:nvSpPr>
         <p:spPr/>
         <p:txBody>
+          <a:bodyPr/>
+          <a:lstStyle/>
+          <a:p>
+            <a:r>
+              <a:rPr lang="en-US" dirty="0" smtClean="0"/>
+              <a:t>EHD </a:t>
+            </a:r>
+            <a:r>
+              <a:rPr lang="en-US" dirty="0" err="1" smtClean="0"/>
+              <a:t>Filmdicke</a:t>
+            </a:r>
+            <a:endParaRPr lang="de-DE" dirty="0"/>
+          </a:p>
+        </p:txBody>
+      </p:sp>
+      <p:sp>
+        <p:nvSpPr>
+          <p:cNvPr id="3" name="Content Placeholder 2"/>
+          <p:cNvSpPr>
+            <a:spLocks noGrp="1"/>
+          </p:cNvSpPr>
+          <p:nvPr>
+            <p:ph idx="1"/>
+          </p:nvPr>
+        </p:nvSpPr>
+        <p:spPr/>
+        <p:txBody>
+          <a:bodyPr/>
+          <a:lstStyle/>
+          <a:p>
+            <a:endParaRPr lang="de-DE"/>
+          </a:p>
+        </p:txBody>
+      </p:sp>
+      <p:sp>
+        <p:nvSpPr>
+          <p:cNvPr id="4" name="Footer Placeholder 3"/>
+          <p:cNvSpPr>
+            <a:spLocks noGrp="1"/>
+          </p:cNvSpPr>
+          <p:nvPr>
+            <p:ph type="ftr" sz="quarter" idx="11"/>
+          </p:nvPr>
+        </p:nvSpPr>
+        <p:spPr/>
+        <p:txBody>
+          <a:bodyPr/>
+          <a:lstStyle/>
+          <a:p>
+            <a:endParaRPr lang="de-DE"/>
+          </a:p>
+        </p:txBody>
+      </p:sp>
+      <p:pic>
+        <p:nvPicPr>
+          <p:cNvPr id="1027" name="Picture 3" descr="C:\Users\dao\workspace\dao_masterarbeit\presentations\bilde\stribeck_curve_02.png"/>
+          <p:cNvPicPr>
+            <a:picLocks noChangeAspect="1" noChangeArrowheads="1"/>
+          </p:cNvPicPr>
+          <p:nvPr/>
+        </p:nvPicPr>
+        <p:blipFill>
+          <a:blip r:embed="rId3">
+            <a:extLst>
+              <a:ext uri="{28A0092B-C50C-407E-A947-70E740481C1C}">
+                <a14:useLocalDpi xmlns:a14="http://schemas.microsoft.com/office/drawing/2010/main" val="0"/>
+              </a:ext>
+            </a:extLst>
+          </a:blip>
+          <a:srcRect/>
+          <a:stretch>
+            <a:fillRect/>
+          </a:stretch>
+        </p:blipFill>
+        <p:spPr bwMode="auto">
+          <a:xfrm>
+            <a:off x="107504" y="1307061"/>
+            <a:ext cx="8604448" cy="4826557"/>
+          </a:xfrm>
+          <a:prstGeom prst="rect">
+            <a:avLst/>
+          </a:prstGeom>
+          <a:noFill/>
+          <a:extLst>
+            <a:ext uri="{909E8E84-426E-40DD-AFC4-6F175D3DCCD1}">
+              <a14:hiddenFill xmlns:a14="http://schemas.microsoft.com/office/drawing/2010/main">
+                <a:solidFill>
+                  <a:srgbClr val="FFFFFF"/>
+                </a:solidFill>
+              </a14:hiddenFill>
+            </a:ext>
+          </a:extLst>
+        </p:spPr>
+      </p:pic>
+      <p:sp>
+        <p:nvSpPr>
+          <p:cNvPr id="5" name="Rectangle 4"/>
+          <p:cNvSpPr/>
+          <p:nvPr/>
+        </p:nvSpPr>
+        <p:spPr bwMode="auto">
+          <a:xfrm>
+            <a:off x="621325" y="1628918"/>
+            <a:ext cx="7576806" cy="540060"/>
+          </a:xfrm>
+          <a:prstGeom prst="rect">
+            <a:avLst/>
+          </a:prstGeom>
+          <a:solidFill>
+            <a:schemeClr val="bg1"/>
+          </a:solidFill>
+          <a:ln w="9525" cap="flat" cmpd="sng" algn="ctr">
+            <a:solidFill>
+              <a:schemeClr val="bg1"/>
+            </a:solidFill>
+            <a:prstDash val="solid"/>
+            <a:round/>
+            <a:headEnd type="none" w="med" len="med"/>
+            <a:tailEnd type="none" w="med" len="med"/>
+          </a:ln>
+          <a:effectLst/>
+          <a:extLst/>
+        </p:spPr>
+        <p:txBody>
+          <a:bodyPr vert="horz" wrap="square" lIns="91440" tIns="45720" rIns="91440" bIns="45720" numCol="1" rtlCol="0" anchor="t" anchorCtr="0" compatLnSpc="1">
+            <a:prstTxWarp prst="textNoShape">
+              <a:avLst/>
+            </a:prstTxWarp>
+          </a:bodyPr>
+          <a:lstStyle/>
+          <a:p>
+            <a:pPr marL="0" marR="0" indent="0" algn="l" defTabSz="914400" rtl="0" eaLnBrk="0" fontAlgn="base" latinLnBrk="0" hangingPunct="0">
+              <a:lnSpc>
+                <a:spcPct val="100000"/>
+              </a:lnSpc>
+              <a:spcBef>
+                <a:spcPct val="0"/>
+              </a:spcBef>
+              <a:spcAft>
+                <a:spcPct val="0"/>
+              </a:spcAft>
+              <a:buClrTx/>
+              <a:buSzTx/>
+              <a:buFontTx/>
+              <a:buNone/>
+              <a:tabLst/>
+            </a:pPr>
+            <a:endParaRPr kumimoji="0" lang="de-DE" sz="2400" b="0" i="0" u="none" strike="noStrike" cap="none" normalizeH="0" baseline="0" dirty="0" smtClean="0">
+              <a:ln>
+                <a:noFill/>
+              </a:ln>
+              <a:solidFill>
+                <a:schemeClr val="tx1"/>
+              </a:solidFill>
+              <a:effectLst/>
+              <a:latin typeface="Arial" charset="0"/>
+              <a:ea typeface="ＭＳ Ｐゴシック" pitchFamily="1" charset="-128"/>
+            </a:endParaRPr>
+          </a:p>
+        </p:txBody>
+      </p:sp>
+      <p:sp>
+        <p:nvSpPr>
+          <p:cNvPr id="6" name="TextBox 5"/>
+          <p:cNvSpPr txBox="1"/>
+          <p:nvPr/>
+        </p:nvSpPr>
+        <p:spPr>
+          <a:xfrm>
+            <a:off x="5904147" y="1772816"/>
+            <a:ext cx="3001143" cy="584775"/>
+          </a:xfrm>
+          <a:prstGeom prst="rect">
+            <a:avLst/>
+          </a:prstGeom>
+          <a:noFill/>
+        </p:spPr>
+        <p:txBody>
+          <a:bodyPr wrap="none" rtlCol="0">
+            <a:spAutoFit/>
+          </a:bodyPr>
+          <a:lstStyle/>
+          <a:p>
+            <a:r>
+              <a:rPr lang="en-US" sz="1600" dirty="0" smtClean="0"/>
+              <a:t>min. film thickness over</a:t>
+            </a:r>
+          </a:p>
+          <a:p>
+            <a:r>
+              <a:rPr lang="en-US" sz="1600" dirty="0" smtClean="0"/>
+              <a:t>RMS surface roughness height</a:t>
+            </a:r>
+            <a:endParaRPr lang="de-DE" sz="1600" dirty="0"/>
+          </a:p>
+        </p:txBody>
+      </p:sp>
+    </p:spTree>
+    <p:extLst>
+      <p:ext uri="{BB962C8B-B14F-4D97-AF65-F5344CB8AC3E}">
+        <p14:creationId xmlns:p14="http://schemas.microsoft.com/office/powerpoint/2010/main" val="2591049949"/>
+      </p:ext>
+    </p:extLst>
+  </p:cSld>
+  <p:clrMapOvr>
+    <a:masterClrMapping/>
+  </p:clrMapOvr>
+  <p:timing>
+    <p:tnLst>
+      <p:par>
+        <p:cTn id="1" dur="indefinite" restart="never" nodeType="tmRoot"/>
+      </p:par>
+    </p:tnLst>
+  </p:timing>
+</p:sld>
+</file>
+
+<file path=ppt/slides/slide5.xml><?xml version="1.0" encoding="utf-8"?>
+<p:sld xmlns:a="http://schemas.openxmlformats.org/drawingml/2006/main" xmlns:r="http://schemas.openxmlformats.org/officeDocument/2006/relationships" xmlns:p="http://schemas.openxmlformats.org/presentationml/2006/main">
+  <p:cSld>
+    <p:spTree>
+      <p:nvGrpSpPr>
+        <p:cNvPr id="1" name=""/>
+        <p:cNvGrpSpPr/>
+        <p:nvPr/>
+      </p:nvGrpSpPr>
+      <p:grpSpPr>
+        <a:xfrm>
+          <a:off x="0" y="0"/>
+          <a:ext cx="0" cy="0"/>
+          <a:chOff x="0" y="0"/>
+          <a:chExt cx="0" cy="0"/>
+        </a:xfrm>
+      </p:grpSpPr>
+      <p:sp>
+        <p:nvSpPr>
+          <p:cNvPr id="5" name="Rectangle 4"/>
+          <p:cNvSpPr/>
+          <p:nvPr/>
+        </p:nvSpPr>
+        <p:spPr bwMode="auto">
+          <a:xfrm>
+            <a:off x="539552" y="4077072"/>
+            <a:ext cx="3420380" cy="468052"/>
+          </a:xfrm>
+          <a:prstGeom prst="rect">
+            <a:avLst/>
+          </a:prstGeom>
+          <a:solidFill>
+            <a:srgbClr val="FFFF00"/>
+          </a:solidFill>
+          <a:ln w="9525" cap="flat" cmpd="sng" algn="ctr">
+            <a:solidFill>
+              <a:schemeClr val="tx1"/>
+            </a:solidFill>
+            <a:prstDash val="solid"/>
+            <a:round/>
+            <a:headEnd type="none" w="med" len="med"/>
+            <a:tailEnd type="none" w="med" len="med"/>
+          </a:ln>
+          <a:effectLst/>
+          <a:extLst/>
+        </p:spPr>
+        <p:txBody>
+          <a:bodyPr vert="horz" wrap="square" lIns="91440" tIns="45720" rIns="91440" bIns="45720" numCol="1" rtlCol="0" anchor="t" anchorCtr="0" compatLnSpc="1">
+            <a:prstTxWarp prst="textNoShape">
+              <a:avLst/>
+            </a:prstTxWarp>
+          </a:bodyPr>
+          <a:lstStyle/>
+          <a:p>
+            <a:pPr marL="0" marR="0" indent="0" algn="l" defTabSz="914400" rtl="0" eaLnBrk="0" fontAlgn="base" latinLnBrk="0" hangingPunct="0">
+              <a:lnSpc>
+                <a:spcPct val="100000"/>
+              </a:lnSpc>
+              <a:spcBef>
+                <a:spcPct val="0"/>
+              </a:spcBef>
+              <a:spcAft>
+                <a:spcPct val="0"/>
+              </a:spcAft>
+              <a:buClrTx/>
+              <a:buSzTx/>
+              <a:buFontTx/>
+              <a:buNone/>
+              <a:tabLst/>
+            </a:pPr>
+            <a:endParaRPr kumimoji="0" lang="de-DE" sz="2400" b="0" i="0" u="none" strike="noStrike" cap="none" normalizeH="0" baseline="0" smtClean="0">
+              <a:ln>
+                <a:noFill/>
+              </a:ln>
+              <a:solidFill>
+                <a:schemeClr val="tx1"/>
+              </a:solidFill>
+              <a:effectLst/>
+              <a:latin typeface="Arial" charset="0"/>
+              <a:ea typeface="ＭＳ Ｐゴシック" pitchFamily="1" charset="-128"/>
+            </a:endParaRPr>
+          </a:p>
+        </p:txBody>
+      </p:sp>
+      <p:sp>
+        <p:nvSpPr>
+          <p:cNvPr id="2" name="Title 1"/>
+          <p:cNvSpPr>
+            <a:spLocks noGrp="1"/>
+          </p:cNvSpPr>
+          <p:nvPr>
+            <p:ph type="title"/>
+          </p:nvPr>
+        </p:nvSpPr>
+        <p:spPr/>
+        <p:txBody>
+          <a:bodyPr/>
+          <a:lstStyle/>
+          <a:p>
+            <a:r>
+              <a:rPr lang="de-DE" dirty="0" smtClean="0"/>
+              <a:t>Vorhersagen des Risikos von Oberflächenschaden</a:t>
+            </a:r>
+            <a:endParaRPr lang="de-DE" dirty="0"/>
+          </a:p>
+        </p:txBody>
+      </p:sp>
+      <p:sp>
+        <p:nvSpPr>
+          <p:cNvPr id="3" name="Content Placeholder 2"/>
+          <p:cNvSpPr>
+            <a:spLocks noGrp="1"/>
+          </p:cNvSpPr>
+          <p:nvPr>
+            <p:ph idx="1"/>
+          </p:nvPr>
+        </p:nvSpPr>
+        <p:spPr>
+          <a:xfrm>
+            <a:off x="431540" y="1600200"/>
+            <a:ext cx="8229600" cy="4525963"/>
+          </a:xfrm>
+        </p:spPr>
+        <p:txBody>
+          <a:bodyPr/>
+          <a:lstStyle/>
+          <a:p>
+            <a:r>
+              <a:rPr lang="de-DE" dirty="0" smtClean="0"/>
+              <a:t>Platische Verformung</a:t>
+            </a:r>
+          </a:p>
+          <a:p>
+            <a:pPr lvl="1">
+              <a:buFont typeface="Symbol" pitchFamily="18" charset="2"/>
+              <a:buChar char="-"/>
+            </a:pPr>
+            <a:r>
+              <a:rPr lang="de-DE" dirty="0"/>
+              <a:t>h</a:t>
+            </a:r>
+            <a:r>
+              <a:rPr lang="de-DE" dirty="0" smtClean="0"/>
+              <a:t>ohe Belastung</a:t>
+            </a:r>
+            <a:endParaRPr lang="de-DE" dirty="0"/>
+          </a:p>
+          <a:p>
+            <a:r>
+              <a:rPr lang="de-DE" dirty="0" smtClean="0"/>
+              <a:t>Kontaktermüdung</a:t>
+            </a:r>
+          </a:p>
+          <a:p>
+            <a:pPr lvl="1">
+              <a:buFont typeface="Symbol" pitchFamily="18" charset="2"/>
+              <a:buChar char="-"/>
+            </a:pPr>
+            <a:r>
+              <a:rPr lang="de-DE" dirty="0" smtClean="0"/>
+              <a:t>pitting, micro pitting</a:t>
+            </a:r>
+          </a:p>
+          <a:p>
+            <a:r>
+              <a:rPr lang="de-DE" dirty="0" smtClean="0"/>
+              <a:t>Riefenbildung</a:t>
+            </a:r>
+          </a:p>
+          <a:p>
+            <a:r>
+              <a:rPr lang="de-DE" dirty="0" smtClean="0"/>
+              <a:t>Schaden wegen Fremdpartikel</a:t>
+            </a:r>
+          </a:p>
+          <a:p>
+            <a:endParaRPr lang="de-DE" dirty="0"/>
+          </a:p>
+          <a:p>
+            <a:pPr marL="0" indent="0">
+              <a:buNone/>
+            </a:pPr>
+            <a:r>
+              <a:rPr lang="de-DE" dirty="0" smtClean="0"/>
+              <a:t>Hoher </a:t>
+            </a:r>
+            <a:r>
+              <a:rPr lang="el-GR" dirty="0" smtClean="0"/>
+              <a:t>Λ</a:t>
+            </a:r>
+            <a:r>
+              <a:rPr lang="de-DE" dirty="0" smtClean="0"/>
+              <a:t>, niedriger das Risiko</a:t>
+            </a:r>
+          </a:p>
+          <a:p>
+            <a:endParaRPr lang="de-DE" dirty="0" smtClean="0"/>
+          </a:p>
+          <a:p>
+            <a:pPr lvl="1">
+              <a:buFont typeface="Symbol" pitchFamily="18" charset="2"/>
+              <a:buChar char="-"/>
+            </a:pPr>
+            <a:endParaRPr lang="de-DE" dirty="0" smtClean="0"/>
+          </a:p>
+        </p:txBody>
+      </p:sp>
+      <p:sp>
+        <p:nvSpPr>
+          <p:cNvPr id="4" name="Footer Placeholder 3"/>
+          <p:cNvSpPr>
+            <a:spLocks noGrp="1"/>
+          </p:cNvSpPr>
+          <p:nvPr>
+            <p:ph type="ftr" sz="quarter" idx="11"/>
+          </p:nvPr>
+        </p:nvSpPr>
+        <p:spPr/>
+        <p:txBody>
+          <a:bodyPr/>
+          <a:lstStyle/>
+          <a:p>
+            <a:endParaRPr lang="de-DE"/>
+          </a:p>
+        </p:txBody>
+      </p:sp>
+    </p:spTree>
+    <p:extLst>
+      <p:ext uri="{BB962C8B-B14F-4D97-AF65-F5344CB8AC3E}">
+        <p14:creationId xmlns:p14="http://schemas.microsoft.com/office/powerpoint/2010/main" val="1788005817"/>
+      </p:ext>
+    </p:extLst>
+  </p:cSld>
+  <p:clrMapOvr>
+    <a:masterClrMapping/>
+  </p:clrMapOvr>
+  <p:timing>
+    <p:tnLst>
+      <p:par>
+        <p:cTn id="1" dur="indefinite" restart="never" nodeType="tmRoot"/>
+      </p:par>
+    </p:tnLst>
+  </p:timing>
+</p:sld>
+</file>
+
+<file path=ppt/slides/slide6.xml><?xml version="1.0" encoding="utf-8"?>
+<p:sld xmlns:a="http://schemas.openxmlformats.org/drawingml/2006/main" xmlns:r="http://schemas.openxmlformats.org/officeDocument/2006/relationships" xmlns:p="http://schemas.openxmlformats.org/presentationml/2006/main">
+  <p:cSld>
+    <p:spTree>
+      <p:nvGrpSpPr>
+        <p:cNvPr id="1" name=""/>
+        <p:cNvGrpSpPr/>
+        <p:nvPr/>
+      </p:nvGrpSpPr>
+      <p:grpSpPr>
+        <a:xfrm>
+          <a:off x="0" y="0"/>
+          <a:ext cx="0" cy="0"/>
+          <a:chOff x="0" y="0"/>
+          <a:chExt cx="0" cy="0"/>
+        </a:xfrm>
+      </p:grpSpPr>
+      <p:sp>
+        <p:nvSpPr>
+          <p:cNvPr id="2" name="Title 1"/>
+          <p:cNvSpPr>
+            <a:spLocks noGrp="1"/>
+          </p:cNvSpPr>
+          <p:nvPr>
+            <p:ph type="title"/>
+          </p:nvPr>
+        </p:nvSpPr>
+        <p:spPr/>
+        <p:txBody>
           <a:bodyPr>
             <a:normAutofit/>
           </a:bodyPr>
@@ -4902,7 +6022,13 @@
           <a:p>
             <a:r>
               <a:rPr lang="de-DE" dirty="0" smtClean="0"/>
-              <a:t>Ultraschall, Laserinduzierte Fluoreszenz</a:t>
+              <a:t>Ultraschall</a:t>
+            </a:r>
+          </a:p>
+          <a:p>
+            <a:r>
+              <a:rPr lang="de-DE" dirty="0" smtClean="0"/>
+              <a:t>Laserinduzierte Fluoreszenz</a:t>
             </a:r>
             <a:endParaRPr lang="de-DE" dirty="0"/>
           </a:p>
@@ -4928,7 +6054,7 @@
 </p:sld>
 </file>
 
-<file path=ppt/slides/slide5.xml><?xml version="1.0" encoding="utf-8"?>
+<file path=ppt/slides/slide7.xml><?xml version="1.0" encoding="utf-8"?>
 <p:sld xmlns:a="http://schemas.openxmlformats.org/drawingml/2006/main" xmlns:r="http://schemas.openxmlformats.org/officeDocument/2006/relationships" xmlns:p="http://schemas.openxmlformats.org/presentationml/2006/main">
   <p:cSld>
     <p:spTree>
@@ -5071,7 +6197,7 @@
 </p:sld>
 </file>
 
-<file path=ppt/slides/slide6.xml><?xml version="1.0" encoding="utf-8"?>
+<file path=ppt/slides/slide8.xml><?xml version="1.0" encoding="utf-8"?>
 <p:sld xmlns:a="http://schemas.openxmlformats.org/drawingml/2006/main" xmlns:r="http://schemas.openxmlformats.org/officeDocument/2006/relationships" xmlns:p="http://schemas.openxmlformats.org/presentationml/2006/main">
   <p:cSld>
     <p:spTree>
@@ -5269,7 +6395,7 @@
         <p:spPr>
           <a:xfrm>
             <a:off x="683568" y="1700808"/>
-            <a:ext cx="1351204" cy="369332"/>
+            <a:ext cx="1281120" cy="830997"/>
           </a:xfrm>
           <a:prstGeom prst="rect">
             <a:avLst/>
@@ -5284,7 +6410,13 @@
           <a:p>
             <a:r>
               <a:rPr lang="de-DE" dirty="0" smtClean="0"/>
-              <a:t>RGB Camera</a:t>
+              <a:t>RGB </a:t>
+            </a:r>
+          </a:p>
+          <a:p>
+            <a:r>
+              <a:rPr lang="de-DE" dirty="0" smtClean="0"/>
+              <a:t>Camera</a:t>
             </a:r>
             <a:endParaRPr lang="de-DE" dirty="0"/>
           </a:p>
@@ -5310,7 +6442,7 @@
 </p:sld>
 </file>
 
-<file path=ppt/slides/slide7.xml><?xml version="1.0" encoding="utf-8"?>
+<file path=ppt/slides/slide9.xml><?xml version="1.0" encoding="utf-8"?>
 <p:sld xmlns:a="http://schemas.openxmlformats.org/drawingml/2006/main" xmlns:r="http://schemas.openxmlformats.org/officeDocument/2006/relationships" xmlns:p="http://schemas.openxmlformats.org/presentationml/2006/main">
   <p:cSld>
     <p:spTree>
@@ -5438,16 +6570,14 @@
           <a:p>
             <a:r>
               <a:rPr lang="de-DE" dirty="0" smtClean="0"/>
-              <a:t>Resistiv</a:t>
-            </a:r>
-            <a:endParaRPr lang="de-DE" dirty="0" smtClean="0"/>
+              <a:t>Resistiv: metal-metal contact</a:t>
+            </a:r>
           </a:p>
           <a:p>
             <a:r>
               <a:rPr lang="de-DE" dirty="0" smtClean="0"/>
-              <a:t>Kapazitiv</a:t>
-            </a:r>
-            <a:endParaRPr lang="de-DE" dirty="0" smtClean="0"/>
+              <a:t>Capacitive: seperation between surfaces</a:t>
+            </a:r>
           </a:p>
         </p:txBody>
       </p:sp>
@@ -5485,408 +6615,6 @@
     <p:extLst>
       <p:ext uri="{BB962C8B-B14F-4D97-AF65-F5344CB8AC3E}">
         <p14:creationId xmlns:p14="http://schemas.microsoft.com/office/powerpoint/2010/main" val="100685475"/>
-      </p:ext>
-    </p:extLst>
-  </p:cSld>
-  <p:clrMapOvr>
-    <a:masterClrMapping/>
-  </p:clrMapOvr>
-  <p:timing>
-    <p:tnLst>
-      <p:par>
-        <p:cTn id="1" dur="indefinite" restart="never" nodeType="tmRoot"/>
-      </p:par>
-    </p:tnLst>
-  </p:timing>
-</p:sld>
-</file>
-
-<file path=ppt/slides/slide8.xml><?xml version="1.0" encoding="utf-8"?>
-<p:sld xmlns:a="http://schemas.openxmlformats.org/drawingml/2006/main" xmlns:r="http://schemas.openxmlformats.org/officeDocument/2006/relationships" xmlns:p="http://schemas.openxmlformats.org/presentationml/2006/main">
-  <p:cSld>
-    <p:spTree>
-      <p:nvGrpSpPr>
-        <p:cNvPr id="1" name=""/>
-        <p:cNvGrpSpPr/>
-        <p:nvPr/>
-      </p:nvGrpSpPr>
-      <p:grpSpPr>
-        <a:xfrm>
-          <a:off x="0" y="0"/>
-          <a:ext cx="0" cy="0"/>
-          <a:chOff x="0" y="0"/>
-          <a:chExt cx="0" cy="0"/>
-        </a:xfrm>
-      </p:grpSpPr>
-      <p:sp>
-        <p:nvSpPr>
-          <p:cNvPr id="2" name="Title 1"/>
-          <p:cNvSpPr>
-            <a:spLocks noGrp="1"/>
-          </p:cNvSpPr>
-          <p:nvPr>
-            <p:ph type="title"/>
-          </p:nvPr>
-        </p:nvSpPr>
-        <p:spPr/>
-        <p:txBody>
-          <a:bodyPr/>
-          <a:lstStyle/>
-          <a:p>
-            <a:r>
-              <a:rPr lang="de-DE" dirty="0" smtClean="0"/>
-              <a:t>Ultraschall</a:t>
-            </a:r>
-            <a:endParaRPr lang="de-DE" dirty="0"/>
-          </a:p>
-        </p:txBody>
-      </p:sp>
-      <p:sp>
-        <p:nvSpPr>
-          <p:cNvPr id="3" name="Content Placeholder 2"/>
-          <p:cNvSpPr>
-            <a:spLocks noGrp="1"/>
-          </p:cNvSpPr>
-          <p:nvPr>
-            <p:ph idx="1"/>
-          </p:nvPr>
-        </p:nvSpPr>
-        <p:spPr/>
-        <p:txBody>
-          <a:bodyPr/>
-          <a:lstStyle/>
-          <a:p>
-            <a:pPr marL="0" indent="0">
-              <a:buNone/>
-            </a:pPr>
-            <a:endParaRPr lang="de-DE" dirty="0"/>
-          </a:p>
-        </p:txBody>
-      </p:sp>
-      <p:pic>
-        <p:nvPicPr>
-          <p:cNvPr id="6146" name="Picture 2"/>
-          <p:cNvPicPr>
-            <a:picLocks noChangeAspect="1" noChangeArrowheads="1"/>
-          </p:cNvPicPr>
-          <p:nvPr/>
-        </p:nvPicPr>
-        <p:blipFill>
-          <a:blip r:embed="rId2">
-            <a:extLst>
-              <a:ext uri="{28A0092B-C50C-407E-A947-70E740481C1C}">
-                <a14:useLocalDpi xmlns:a14="http://schemas.microsoft.com/office/drawing/2010/main" val="0"/>
-              </a:ext>
-            </a:extLst>
-          </a:blip>
-          <a:srcRect/>
-          <a:stretch>
-            <a:fillRect/>
-          </a:stretch>
-        </p:blipFill>
-        <p:spPr bwMode="auto">
-          <a:xfrm>
-            <a:off x="899592" y="1837792"/>
-            <a:ext cx="7525691" cy="4087738"/>
-          </a:xfrm>
-          <a:prstGeom prst="rect">
-            <a:avLst/>
-          </a:prstGeom>
-          <a:noFill/>
-          <a:ln>
-            <a:noFill/>
-          </a:ln>
-          <a:effectLst/>
-          <a:extLst>
-            <a:ext uri="{909E8E84-426E-40DD-AFC4-6F175D3DCCD1}">
-              <a14:hiddenFill xmlns:a14="http://schemas.microsoft.com/office/drawing/2010/main">
-                <a:solidFill>
-                  <a:schemeClr val="accent1"/>
-                </a:solidFill>
-              </a14:hiddenFill>
-            </a:ext>
-            <a:ext uri="{91240B29-F687-4F45-9708-019B960494DF}">
-              <a14:hiddenLine xmlns:a14="http://schemas.microsoft.com/office/drawing/2010/main" w="9525">
-                <a:solidFill>
-                  <a:schemeClr val="tx1"/>
-                </a:solidFill>
-                <a:miter lim="800000"/>
-                <a:headEnd/>
-                <a:tailEnd/>
-              </a14:hiddenLine>
-            </a:ext>
-            <a:ext uri="{AF507438-7753-43E0-B8FC-AC1667EBCBE1}">
-              <a14:hiddenEffects xmlns:a14="http://schemas.microsoft.com/office/drawing/2010/main">
-                <a:effectLst>
-                  <a:outerShdw dist="35921" dir="2700000" algn="ctr" rotWithShape="0">
-                    <a:schemeClr val="bg2"/>
-                  </a:outerShdw>
-                </a:effectLst>
-              </a14:hiddenEffects>
-            </a:ext>
-          </a:extLst>
-        </p:spPr>
-      </p:pic>
-    </p:spTree>
-    <p:extLst>
-      <p:ext uri="{BB962C8B-B14F-4D97-AF65-F5344CB8AC3E}">
-        <p14:creationId xmlns:p14="http://schemas.microsoft.com/office/powerpoint/2010/main" val="2544933492"/>
-      </p:ext>
-    </p:extLst>
-  </p:cSld>
-  <p:clrMapOvr>
-    <a:masterClrMapping/>
-  </p:clrMapOvr>
-  <p:timing>
-    <p:tnLst>
-      <p:par>
-        <p:cTn id="1" dur="indefinite" restart="never" nodeType="tmRoot"/>
-      </p:par>
-    </p:tnLst>
-  </p:timing>
-</p:sld>
-</file>
-
-<file path=ppt/slides/slide9.xml><?xml version="1.0" encoding="utf-8"?>
-<p:sld xmlns:a="http://schemas.openxmlformats.org/drawingml/2006/main" xmlns:r="http://schemas.openxmlformats.org/officeDocument/2006/relationships" xmlns:p="http://schemas.openxmlformats.org/presentationml/2006/main">
-  <p:cSld>
-    <p:spTree>
-      <p:nvGrpSpPr>
-        <p:cNvPr id="1" name=""/>
-        <p:cNvGrpSpPr/>
-        <p:nvPr/>
-      </p:nvGrpSpPr>
-      <p:grpSpPr>
-        <a:xfrm>
-          <a:off x="0" y="0"/>
-          <a:ext cx="0" cy="0"/>
-          <a:chOff x="0" y="0"/>
-          <a:chExt cx="0" cy="0"/>
-        </a:xfrm>
-      </p:grpSpPr>
-      <p:sp>
-        <p:nvSpPr>
-          <p:cNvPr id="2" name="Title 1"/>
-          <p:cNvSpPr>
-            <a:spLocks noGrp="1"/>
-          </p:cNvSpPr>
-          <p:nvPr>
-            <p:ph type="title"/>
-          </p:nvPr>
-        </p:nvSpPr>
-        <p:spPr/>
-        <p:txBody>
-          <a:bodyPr/>
-          <a:lstStyle/>
-          <a:p>
-            <a:r>
-              <a:rPr lang="de-DE" dirty="0" smtClean="0"/>
-              <a:t>Laserinduzierte Fluoreszenz</a:t>
-            </a:r>
-            <a:endParaRPr lang="de-DE" dirty="0"/>
-          </a:p>
-        </p:txBody>
-      </p:sp>
-      <p:sp>
-        <p:nvSpPr>
-          <p:cNvPr id="3" name="Content Placeholder 2"/>
-          <p:cNvSpPr>
-            <a:spLocks noGrp="1"/>
-          </p:cNvSpPr>
-          <p:nvPr>
-            <p:ph idx="1"/>
-          </p:nvPr>
-        </p:nvSpPr>
-        <p:spPr/>
-        <p:txBody>
-          <a:bodyPr/>
-          <a:lstStyle/>
-          <a:p>
-            <a:endParaRPr lang="de-DE" dirty="0"/>
-          </a:p>
-        </p:txBody>
-      </p:sp>
-      <p:sp>
-        <p:nvSpPr>
-          <p:cNvPr id="4" name="Footer Placeholder 3"/>
-          <p:cNvSpPr>
-            <a:spLocks noGrp="1"/>
-          </p:cNvSpPr>
-          <p:nvPr>
-            <p:ph type="ftr" sz="quarter" idx="11"/>
-          </p:nvPr>
-        </p:nvSpPr>
-        <p:spPr/>
-        <p:txBody>
-          <a:bodyPr/>
-          <a:lstStyle/>
-          <a:p>
-            <a:endParaRPr lang="de-DE"/>
-          </a:p>
-        </p:txBody>
-      </p:sp>
-      <p:pic>
-        <p:nvPicPr>
-          <p:cNvPr id="1026" name="Picture 2"/>
-          <p:cNvPicPr>
-            <a:picLocks noChangeAspect="1" noChangeArrowheads="1"/>
-          </p:cNvPicPr>
-          <p:nvPr/>
-        </p:nvPicPr>
-        <p:blipFill>
-          <a:blip r:embed="rId2">
-            <a:extLst>
-              <a:ext uri="{28A0092B-C50C-407E-A947-70E740481C1C}">
-                <a14:useLocalDpi xmlns:a14="http://schemas.microsoft.com/office/drawing/2010/main" val="0"/>
-              </a:ext>
-            </a:extLst>
-          </a:blip>
-          <a:srcRect/>
-          <a:stretch>
-            <a:fillRect/>
-          </a:stretch>
-        </p:blipFill>
-        <p:spPr bwMode="auto">
-          <a:xfrm>
-            <a:off x="431540" y="2591193"/>
-            <a:ext cx="4751623" cy="2402283"/>
-          </a:xfrm>
-          <a:prstGeom prst="rect">
-            <a:avLst/>
-          </a:prstGeom>
-          <a:noFill/>
-          <a:ln>
-            <a:noFill/>
-          </a:ln>
-          <a:effectLst/>
-          <a:extLst>
-            <a:ext uri="{909E8E84-426E-40DD-AFC4-6F175D3DCCD1}">
-              <a14:hiddenFill xmlns:a14="http://schemas.microsoft.com/office/drawing/2010/main">
-                <a:solidFill>
-                  <a:schemeClr val="accent1"/>
-                </a:solidFill>
-              </a14:hiddenFill>
-            </a:ext>
-            <a:ext uri="{91240B29-F687-4F45-9708-019B960494DF}">
-              <a14:hiddenLine xmlns:a14="http://schemas.microsoft.com/office/drawing/2010/main" w="9525">
-                <a:solidFill>
-                  <a:schemeClr val="tx1"/>
-                </a:solidFill>
-                <a:miter lim="800000"/>
-                <a:headEnd/>
-                <a:tailEnd/>
-              </a14:hiddenLine>
-            </a:ext>
-            <a:ext uri="{AF507438-7753-43E0-B8FC-AC1667EBCBE1}">
-              <a14:hiddenEffects xmlns:a14="http://schemas.microsoft.com/office/drawing/2010/main">
-                <a:effectLst>
-                  <a:outerShdw dist="35921" dir="2700000" algn="ctr" rotWithShape="0">
-                    <a:schemeClr val="bg2"/>
-                  </a:outerShdw>
-                </a:effectLst>
-              </a14:hiddenEffects>
-            </a:ext>
-          </a:extLst>
-        </p:spPr>
-      </p:pic>
-      <p:pic>
-        <p:nvPicPr>
-          <p:cNvPr id="1027" name="Picture 3"/>
-          <p:cNvPicPr>
-            <a:picLocks noChangeAspect="1" noChangeArrowheads="1"/>
-          </p:cNvPicPr>
-          <p:nvPr/>
-        </p:nvPicPr>
-        <p:blipFill>
-          <a:blip r:embed="rId3">
-            <a:extLst>
-              <a:ext uri="{28A0092B-C50C-407E-A947-70E740481C1C}">
-                <a14:useLocalDpi xmlns:a14="http://schemas.microsoft.com/office/drawing/2010/main" val="0"/>
-              </a:ext>
-            </a:extLst>
-          </a:blip>
-          <a:srcRect/>
-          <a:stretch>
-            <a:fillRect/>
-          </a:stretch>
-        </p:blipFill>
-        <p:spPr bwMode="auto">
-          <a:xfrm>
-            <a:off x="5292080" y="2420888"/>
-            <a:ext cx="3742403" cy="3009516"/>
-          </a:xfrm>
-          <a:prstGeom prst="rect">
-            <a:avLst/>
-          </a:prstGeom>
-          <a:noFill/>
-          <a:ln>
-            <a:noFill/>
-          </a:ln>
-          <a:effectLst/>
-          <a:extLst>
-            <a:ext uri="{909E8E84-426E-40DD-AFC4-6F175D3DCCD1}">
-              <a14:hiddenFill xmlns:a14="http://schemas.microsoft.com/office/drawing/2010/main">
-                <a:solidFill>
-                  <a:schemeClr val="accent1"/>
-                </a:solidFill>
-              </a14:hiddenFill>
-            </a:ext>
-            <a:ext uri="{91240B29-F687-4F45-9708-019B960494DF}">
-              <a14:hiddenLine xmlns:a14="http://schemas.microsoft.com/office/drawing/2010/main" w="9525">
-                <a:solidFill>
-                  <a:schemeClr val="tx1"/>
-                </a:solidFill>
-                <a:miter lim="800000"/>
-                <a:headEnd/>
-                <a:tailEnd/>
-              </a14:hiddenLine>
-            </a:ext>
-            <a:ext uri="{AF507438-7753-43E0-B8FC-AC1667EBCBE1}">
-              <a14:hiddenEffects xmlns:a14="http://schemas.microsoft.com/office/drawing/2010/main">
-                <a:effectLst>
-                  <a:outerShdw dist="35921" dir="2700000" algn="ctr" rotWithShape="0">
-                    <a:schemeClr val="bg2"/>
-                  </a:outerShdw>
-                </a:effectLst>
-              </a14:hiddenEffects>
-            </a:ext>
-          </a:extLst>
-        </p:spPr>
-      </p:pic>
-      <p:sp>
-        <p:nvSpPr>
-          <p:cNvPr id="5" name="TextBox 4"/>
-          <p:cNvSpPr txBox="1"/>
-          <p:nvPr/>
-        </p:nvSpPr>
-        <p:spPr>
-          <a:xfrm>
-            <a:off x="899592" y="3453780"/>
-            <a:ext cx="697627" cy="338554"/>
-          </a:xfrm>
-          <a:prstGeom prst="rect">
-            <a:avLst/>
-          </a:prstGeom>
-          <a:noFill/>
-        </p:spPr>
-        <p:txBody>
-          <a:bodyPr wrap="none" rtlCol="0">
-            <a:spAutoFit/>
-          </a:bodyPr>
-          <a:lstStyle/>
-          <a:p>
-            <a:r>
-              <a:rPr lang="de-DE" sz="1600" dirty="0" smtClean="0"/>
-              <a:t>Laser</a:t>
-            </a:r>
-            <a:endParaRPr lang="de-DE" sz="1600" dirty="0"/>
-          </a:p>
-        </p:txBody>
-      </p:sp>
-    </p:spTree>
-    <p:extLst>
-      <p:ext uri="{BB962C8B-B14F-4D97-AF65-F5344CB8AC3E}">
-        <p14:creationId xmlns:p14="http://schemas.microsoft.com/office/powerpoint/2010/main" val="1283500121"/>
       </p:ext>
     </p:extLst>
   </p:cSld>

</xml_diff>

<commit_message>
Some change in the gliederung. Update the presentation for vw
</commit_message>
<xml_diff>
--- a/presentations/ziel_der_arbeit_vw.pptx
+++ b/presentations/ziel_der_arbeit_vw.pptx
@@ -153,7 +153,7 @@
   </p:defaultTextStyle>
   <p:extLst>
     <p:ext uri="{EFAFB233-063F-42B5-8137-9DF3F51BA10A}">
-      <p15:sldGuideLst xmlns:p15="http://schemas.microsoft.com/office/powerpoint/2012/main" xmlns="">
+      <p15:sldGuideLst xmlns="" xmlns:p15="http://schemas.microsoft.com/office/powerpoint/2012/main">
         <p15:guide id="1" orient="horz" pos="595">
           <p15:clr>
             <a:srgbClr val="A4A3A4"/>
@@ -207,7 +207,7 @@
       </p15:sldGuideLst>
     </p:ext>
     <p:ext uri="{2D200454-40CA-4A62-9FC3-DE9A4176ACB9}">
-      <p15:notesGuideLst xmlns:p15="http://schemas.microsoft.com/office/powerpoint/2012/main" xmlns="">
+      <p15:notesGuideLst xmlns="" xmlns:p15="http://schemas.microsoft.com/office/powerpoint/2012/main">
         <p15:guide id="1" orient="horz" pos="3127">
           <p15:clr>
             <a:srgbClr val="A4A3A4"/>
@@ -1734,7 +1734,7 @@
           <a:p>
             <a:fld id="{1115177A-7322-4D6B-8FDA-6F20E91D0809}" type="datetimeFigureOut">
               <a:rPr lang="de-DE" smtClean="0"/>
-              <a:t>07.11.2017</a:t>
+              <a:t>09.11.2017</a:t>
             </a:fld>
             <a:endParaRPr lang="de-DE"/>
           </a:p>
@@ -1943,7 +1943,7 @@
           <a:p>
             <a:fld id="{1115177A-7322-4D6B-8FDA-6F20E91D0809}" type="datetimeFigureOut">
               <a:rPr lang="de-DE" smtClean="0"/>
-              <a:t>07.11.2017</a:t>
+              <a:t>09.11.2017</a:t>
             </a:fld>
             <a:endParaRPr lang="de-DE"/>
           </a:p>
@@ -2408,7 +2408,7 @@
           <a:p>
             <a:fld id="{1115177A-7322-4D6B-8FDA-6F20E91D0809}" type="datetimeFigureOut">
               <a:rPr lang="de-DE" smtClean="0"/>
-              <a:t>07.11.2017</a:t>
+              <a:t>09.11.2017</a:t>
             </a:fld>
             <a:endParaRPr lang="de-DE"/>
           </a:p>
@@ -3683,25 +3683,78 @@
             <p:ph type="title"/>
           </p:nvPr>
         </p:nvSpPr>
-        <p:spPr/>
+        <p:spPr>
+          <a:xfrm>
+            <a:off x="0" y="1124744"/>
+            <a:ext cx="8915400" cy="396714"/>
+          </a:xfrm>
+        </p:spPr>
         <p:txBody>
           <a:bodyPr/>
           <a:lstStyle/>
           <a:p>
             <a:pPr algn="ctr"/>
             <a:r>
-              <a:rPr lang="en-US" dirty="0" err="1" smtClean="0"/>
-              <a:t>Titel</a:t>
-            </a:r>
-            <a:r>
-              <a:rPr lang="en-US" dirty="0" smtClean="0"/>
-              <a:t> der </a:t>
-            </a:r>
-            <a:r>
-              <a:rPr lang="en-US" dirty="0" err="1" smtClean="0"/>
-              <a:t>Arbeit</a:t>
-            </a:r>
-            <a:endParaRPr lang="de-DE" dirty="0"/>
+              <a:rPr lang="en-US" sz="2400" dirty="0" err="1" smtClean="0"/>
+              <a:t>Modulares</a:t>
+            </a:r>
+            <a:r>
+              <a:rPr lang="en-US" sz="2400" dirty="0" smtClean="0"/>
+              <a:t> </a:t>
+            </a:r>
+            <a:r>
+              <a:rPr lang="en-US" sz="2400" dirty="0" err="1" smtClean="0"/>
+              <a:t>Messsystem</a:t>
+            </a:r>
+            <a:r>
+              <a:rPr lang="en-US" sz="2400" dirty="0" smtClean="0"/>
+              <a:t> </a:t>
+            </a:r>
+            <a:r>
+              <a:rPr lang="en-US" sz="2400" dirty="0" err="1" smtClean="0"/>
+              <a:t>zur</a:t>
+            </a:r>
+            <a:r>
+              <a:rPr lang="en-US" sz="2400" dirty="0" smtClean="0"/>
+              <a:t> </a:t>
+            </a:r>
+            <a:r>
+              <a:rPr lang="en-US" sz="2400" dirty="0" err="1" smtClean="0"/>
+              <a:t>optischen</a:t>
+            </a:r>
+            <a:r>
+              <a:rPr lang="en-US" sz="2400" dirty="0" smtClean="0"/>
+              <a:t> und </a:t>
+            </a:r>
+            <a:r>
+              <a:rPr lang="en-US" sz="2400" dirty="0" err="1" smtClean="0"/>
+              <a:t>kapazitiven</a:t>
+            </a:r>
+            <a:r>
+              <a:rPr lang="en-US" sz="2400" dirty="0" smtClean="0"/>
+              <a:t> </a:t>
+            </a:r>
+            <a:r>
+              <a:rPr lang="en-US" sz="2400" dirty="0" err="1" smtClean="0"/>
+              <a:t>Schmierfilmdickenmessung</a:t>
+            </a:r>
+            <a:r>
+              <a:rPr lang="en-US" sz="2400" dirty="0" smtClean="0"/>
+              <a:t> in </a:t>
+            </a:r>
+            <a:r>
+              <a:rPr lang="en-US" sz="2400" dirty="0" err="1" smtClean="0"/>
+              <a:t>einem</a:t>
+            </a:r>
+            <a:r>
+              <a:rPr lang="en-US" sz="2400" dirty="0" smtClean="0"/>
+              <a:t> EHD-</a:t>
+            </a:r>
+            <a:r>
+              <a:rPr lang="en-US" sz="2400" dirty="0" err="1" smtClean="0"/>
+              <a:t>Kontakt</a:t>
+            </a:r>
+            <a:endParaRPr lang="de-DE" sz="2400" dirty="0"/>
           </a:p>
         </p:txBody>
       </p:sp>
@@ -5062,11 +5115,7 @@
             </a:pPr>
             <a:r>
               <a:rPr lang="de-DE" dirty="0" smtClean="0"/>
-              <a:t>Kugel über die </a:t>
-            </a:r>
-            <a:r>
-              <a:rPr lang="de-DE" dirty="0" smtClean="0"/>
-              <a:t>Kante</a:t>
+              <a:t>Kugel über die Kante</a:t>
             </a:r>
           </a:p>
           <a:p>

</xml_diff>

<commit_message>
Updated the presentation and continue to write the thesis
</commit_message>
<xml_diff>
--- a/presentations/ziel_der_arbeit_vw.pptx
+++ b/presentations/ziel_der_arbeit_vw.pptx
@@ -5,7 +5,7 @@
     <p:sldMasterId id="2147483648" r:id="rId1"/>
   </p:sldMasterIdLst>
   <p:notesMasterIdLst>
-    <p:notesMasterId r:id="rId17"/>
+    <p:notesMasterId r:id="rId19"/>
   </p:notesMasterIdLst>
   <p:sldIdLst>
     <p:sldId id="444" r:id="rId2"/>
@@ -14,15 +14,17 @@
     <p:sldId id="457" r:id="rId5"/>
     <p:sldId id="458" r:id="rId6"/>
     <p:sldId id="447" r:id="rId7"/>
-    <p:sldId id="448" r:id="rId8"/>
-    <p:sldId id="449" r:id="rId9"/>
-    <p:sldId id="450" r:id="rId10"/>
-    <p:sldId id="451" r:id="rId11"/>
-    <p:sldId id="456" r:id="rId12"/>
-    <p:sldId id="452" r:id="rId13"/>
-    <p:sldId id="455" r:id="rId14"/>
-    <p:sldId id="453" r:id="rId15"/>
-    <p:sldId id="454" r:id="rId16"/>
+    <p:sldId id="459" r:id="rId8"/>
+    <p:sldId id="448" r:id="rId9"/>
+    <p:sldId id="449" r:id="rId10"/>
+    <p:sldId id="450" r:id="rId11"/>
+    <p:sldId id="451" r:id="rId12"/>
+    <p:sldId id="456" r:id="rId13"/>
+    <p:sldId id="452" r:id="rId14"/>
+    <p:sldId id="455" r:id="rId15"/>
+    <p:sldId id="453" r:id="rId16"/>
+    <p:sldId id="454" r:id="rId17"/>
+    <p:sldId id="460" r:id="rId18"/>
   </p:sldIdLst>
   <p:sldSz cx="9144000" cy="6858000" type="screen4x3"/>
   <p:notesSz cx="6797675" cy="9928225"/>
@@ -1734,7 +1736,7 @@
           <a:p>
             <a:fld id="{1115177A-7322-4D6B-8FDA-6F20E91D0809}" type="datetimeFigureOut">
               <a:rPr lang="de-DE" smtClean="0"/>
-              <a:t>09.11.2017</a:t>
+              <a:t>11.12.2017</a:t>
             </a:fld>
             <a:endParaRPr lang="de-DE"/>
           </a:p>
@@ -1943,7 +1945,7 @@
           <a:p>
             <a:fld id="{1115177A-7322-4D6B-8FDA-6F20E91D0809}" type="datetimeFigureOut">
               <a:rPr lang="de-DE" smtClean="0"/>
-              <a:t>09.11.2017</a:t>
+              <a:t>11.12.2017</a:t>
             </a:fld>
             <a:endParaRPr lang="de-DE"/>
           </a:p>
@@ -2408,7 +2410,7 @@
           <a:p>
             <a:fld id="{1115177A-7322-4D6B-8FDA-6F20E91D0809}" type="datetimeFigureOut">
               <a:rPr lang="de-DE" smtClean="0"/>
-              <a:t>09.11.2017</a:t>
+              <a:t>11.12.2017</a:t>
             </a:fld>
             <a:endParaRPr lang="de-DE"/>
           </a:p>
@@ -3844,6 +3846,36 @@
           </a:extLst>
         </p:spPr>
       </p:pic>
+      <p:sp>
+        <p:nvSpPr>
+          <p:cNvPr id="4" name="TextBox 3"/>
+          <p:cNvSpPr txBox="1"/>
+          <p:nvPr/>
+        </p:nvSpPr>
+        <p:spPr>
+          <a:xfrm>
+            <a:off x="6027335" y="6023826"/>
+            <a:ext cx="1744388" cy="215444"/>
+          </a:xfrm>
+          <a:prstGeom prst="rect">
+            <a:avLst/>
+          </a:prstGeom>
+          <a:noFill/>
+        </p:spPr>
+        <p:txBody>
+          <a:bodyPr wrap="none" rtlCol="0">
+            <a:spAutoFit/>
+          </a:bodyPr>
+          <a:lstStyle/>
+          <a:p>
+            <a:r>
+              <a:rPr lang="de-DE" sz="800" dirty="0" smtClean="0"/>
+              <a:t>Quelle: Dr. Wedeven, What is ehd</a:t>
+            </a:r>
+            <a:endParaRPr lang="de-DE" sz="800" dirty="0"/>
+          </a:p>
+        </p:txBody>
+      </p:sp>
     </p:spTree>
     <p:extLst>
       <p:ext uri="{BB962C8B-B14F-4D97-AF65-F5344CB8AC3E}">
@@ -3865,6 +3897,228 @@
 </file>
 
 <file path=ppt/slides/slide10.xml><?xml version="1.0" encoding="utf-8"?>
+<p:sld xmlns:a="http://schemas.openxmlformats.org/drawingml/2006/main" xmlns:r="http://schemas.openxmlformats.org/officeDocument/2006/relationships" xmlns:p="http://schemas.openxmlformats.org/presentationml/2006/main">
+  <p:cSld>
+    <p:spTree>
+      <p:nvGrpSpPr>
+        <p:cNvPr id="1" name=""/>
+        <p:cNvGrpSpPr/>
+        <p:nvPr/>
+      </p:nvGrpSpPr>
+      <p:grpSpPr>
+        <a:xfrm>
+          <a:off x="0" y="0"/>
+          <a:ext cx="0" cy="0"/>
+          <a:chOff x="0" y="0"/>
+          <a:chExt cx="0" cy="0"/>
+        </a:xfrm>
+      </p:grpSpPr>
+      <p:pic>
+        <p:nvPicPr>
+          <p:cNvPr id="5122" name="Picture 2"/>
+          <p:cNvPicPr>
+            <a:picLocks noChangeAspect="1" noChangeArrowheads="1"/>
+          </p:cNvPicPr>
+          <p:nvPr/>
+        </p:nvPicPr>
+        <p:blipFill>
+          <a:blip r:embed="rId2">
+            <a:extLst>
+              <a:ext uri="{28A0092B-C50C-407E-A947-70E740481C1C}">
+                <a14:useLocalDpi xmlns:a14="http://schemas.microsoft.com/office/drawing/2010/main" val="0"/>
+              </a:ext>
+            </a:extLst>
+          </a:blip>
+          <a:srcRect/>
+          <a:stretch>
+            <a:fillRect/>
+          </a:stretch>
+        </p:blipFill>
+        <p:spPr bwMode="auto">
+          <a:xfrm>
+            <a:off x="539552" y="2132856"/>
+            <a:ext cx="8070044" cy="4283608"/>
+          </a:xfrm>
+          <a:prstGeom prst="rect">
+            <a:avLst/>
+          </a:prstGeom>
+          <a:noFill/>
+          <a:ln>
+            <a:noFill/>
+          </a:ln>
+          <a:effectLst/>
+          <a:extLst>
+            <a:ext uri="{909E8E84-426E-40DD-AFC4-6F175D3DCCD1}">
+              <a14:hiddenFill xmlns:a14="http://schemas.microsoft.com/office/drawing/2010/main">
+                <a:solidFill>
+                  <a:schemeClr val="accent1"/>
+                </a:solidFill>
+              </a14:hiddenFill>
+            </a:ext>
+            <a:ext uri="{91240B29-F687-4F45-9708-019B960494DF}">
+              <a14:hiddenLine xmlns:a14="http://schemas.microsoft.com/office/drawing/2010/main" w="9525">
+                <a:solidFill>
+                  <a:schemeClr val="tx1"/>
+                </a:solidFill>
+                <a:miter lim="800000"/>
+                <a:headEnd/>
+                <a:tailEnd/>
+              </a14:hiddenLine>
+            </a:ext>
+            <a:ext uri="{AF507438-7753-43E0-B8FC-AC1667EBCBE1}">
+              <a14:hiddenEffects xmlns:a14="http://schemas.microsoft.com/office/drawing/2010/main">
+                <a:effectLst>
+                  <a:outerShdw dist="35921" dir="2700000" algn="ctr" rotWithShape="0">
+                    <a:schemeClr val="bg2"/>
+                  </a:outerShdw>
+                </a:effectLst>
+              </a14:hiddenEffects>
+            </a:ext>
+          </a:extLst>
+        </p:spPr>
+      </p:pic>
+      <p:sp>
+        <p:nvSpPr>
+          <p:cNvPr id="2" name="Title 1"/>
+          <p:cNvSpPr>
+            <a:spLocks noGrp="1"/>
+          </p:cNvSpPr>
+          <p:nvPr>
+            <p:ph type="title"/>
+          </p:nvPr>
+        </p:nvSpPr>
+        <p:spPr/>
+        <p:txBody>
+          <a:bodyPr/>
+          <a:lstStyle/>
+          <a:p>
+            <a:r>
+              <a:rPr lang="de-DE" dirty="0" smtClean="0"/>
+              <a:t>Elektrische Methode</a:t>
+            </a:r>
+            <a:endParaRPr lang="de-DE" dirty="0"/>
+          </a:p>
+        </p:txBody>
+      </p:sp>
+      <p:sp>
+        <p:nvSpPr>
+          <p:cNvPr id="3" name="Content Placeholder 2"/>
+          <p:cNvSpPr>
+            <a:spLocks noGrp="1"/>
+          </p:cNvSpPr>
+          <p:nvPr>
+            <p:ph idx="1"/>
+          </p:nvPr>
+        </p:nvSpPr>
+        <p:spPr>
+          <a:xfrm>
+            <a:off x="457200" y="1600201"/>
+            <a:ext cx="8229600" cy="1108720"/>
+          </a:xfrm>
+        </p:spPr>
+        <p:txBody>
+          <a:bodyPr>
+            <a:normAutofit/>
+          </a:bodyPr>
+          <a:lstStyle/>
+          <a:p>
+            <a:r>
+              <a:rPr lang="de-DE" dirty="0" smtClean="0"/>
+              <a:t>Resistiv: Metall-Metall Kontakt</a:t>
+            </a:r>
+          </a:p>
+          <a:p>
+            <a:r>
+              <a:rPr lang="de-DE" dirty="0" smtClean="0"/>
+              <a:t>Kapazitiv: Trennung von Kontaktflächen</a:t>
+            </a:r>
+          </a:p>
+        </p:txBody>
+      </p:sp>
+      <p:sp>
+        <p:nvSpPr>
+          <p:cNvPr id="4" name="TextBox 3"/>
+          <p:cNvSpPr txBox="1"/>
+          <p:nvPr/>
+        </p:nvSpPr>
+        <p:spPr>
+          <a:xfrm>
+            <a:off x="6339823" y="1800773"/>
+            <a:ext cx="2372637" cy="338554"/>
+          </a:xfrm>
+          <a:prstGeom prst="rect">
+            <a:avLst/>
+          </a:prstGeom>
+          <a:noFill/>
+        </p:spPr>
+        <p:txBody>
+          <a:bodyPr wrap="none" rtlCol="0">
+            <a:spAutoFit/>
+          </a:bodyPr>
+          <a:lstStyle/>
+          <a:p>
+            <a:r>
+              <a:rPr lang="en-US" sz="1600" dirty="0" smtClean="0"/>
+              <a:t>Voltage discharge curve</a:t>
+            </a:r>
+            <a:endParaRPr lang="de-DE" sz="1600" dirty="0"/>
+          </a:p>
+        </p:txBody>
+      </p:sp>
+      <p:sp>
+        <p:nvSpPr>
+          <p:cNvPr id="6" name="TextBox 5"/>
+          <p:cNvSpPr txBox="1"/>
+          <p:nvPr/>
+        </p:nvSpPr>
+        <p:spPr>
+          <a:xfrm>
+            <a:off x="6300192" y="5913856"/>
+            <a:ext cx="1925527" cy="215444"/>
+          </a:xfrm>
+          <a:prstGeom prst="rect">
+            <a:avLst/>
+          </a:prstGeom>
+          <a:noFill/>
+        </p:spPr>
+        <p:txBody>
+          <a:bodyPr wrap="none" rtlCol="0">
+            <a:spAutoFit/>
+          </a:bodyPr>
+          <a:lstStyle/>
+          <a:p>
+            <a:r>
+              <a:rPr lang="de-DE" sz="800" dirty="0" smtClean="0"/>
+              <a:t>Quelle: Jablonka</a:t>
+            </a:r>
+            <a:r>
+              <a:rPr lang="de-DE" sz="800" dirty="0"/>
+              <a:t>, Glovnea, Bongaerts</a:t>
+            </a:r>
+          </a:p>
+        </p:txBody>
+      </p:sp>
+    </p:spTree>
+    <p:extLst>
+      <p:ext uri="{BB962C8B-B14F-4D97-AF65-F5344CB8AC3E}">
+        <p14:creationId xmlns:p14="http://schemas.microsoft.com/office/powerpoint/2010/main" val="100685475"/>
+      </p:ext>
+    </p:extLst>
+  </p:cSld>
+  <p:clrMapOvr>
+    <a:masterClrMapping/>
+  </p:clrMapOvr>
+  <p:timing>
+    <p:tnLst>
+      <p:par>
+        <p:cTn id="1" dur="indefinite" restart="never" nodeType="tmRoot"/>
+      </p:par>
+    </p:tnLst>
+  </p:timing>
+</p:sld>
+</file>
+
+<file path=ppt/slides/slide11.xml><?xml version="1.0" encoding="utf-8"?>
 <p:sld xmlns:a="http://schemas.openxmlformats.org/drawingml/2006/main" xmlns:r="http://schemas.openxmlformats.org/officeDocument/2006/relationships" xmlns:p="http://schemas.openxmlformats.org/presentationml/2006/main">
   <p:cSld>
     <p:spTree>
@@ -3990,6 +4244,36 @@
           </a:extLst>
         </p:spPr>
       </p:pic>
+      <p:sp>
+        <p:nvSpPr>
+          <p:cNvPr id="4" name="TextBox 3"/>
+          <p:cNvSpPr txBox="1"/>
+          <p:nvPr/>
+        </p:nvSpPr>
+        <p:spPr>
+          <a:xfrm>
+            <a:off x="4214237" y="6201598"/>
+            <a:ext cx="896399" cy="215444"/>
+          </a:xfrm>
+          <a:prstGeom prst="rect">
+            <a:avLst/>
+          </a:prstGeom>
+          <a:noFill/>
+        </p:spPr>
+        <p:txBody>
+          <a:bodyPr wrap="none" rtlCol="0">
+            <a:spAutoFit/>
+          </a:bodyPr>
+          <a:lstStyle/>
+          <a:p>
+            <a:r>
+              <a:rPr lang="de-DE" sz="800" dirty="0" smtClean="0"/>
+              <a:t>Quelle: Furtuna</a:t>
+            </a:r>
+            <a:endParaRPr lang="de-DE" sz="800" dirty="0"/>
+          </a:p>
+        </p:txBody>
+      </p:sp>
     </p:spTree>
     <p:extLst>
       <p:ext uri="{BB962C8B-B14F-4D97-AF65-F5344CB8AC3E}">
@@ -4010,7 +4294,7 @@
 </p:sld>
 </file>
 
-<file path=ppt/slides/slide11.xml><?xml version="1.0" encoding="utf-8"?>
+<file path=ppt/slides/slide12.xml><?xml version="1.0" encoding="utf-8"?>
 <p:sld xmlns:a="http://schemas.openxmlformats.org/drawingml/2006/main" xmlns:r="http://schemas.openxmlformats.org/officeDocument/2006/relationships" xmlns:p="http://schemas.openxmlformats.org/presentationml/2006/main">
   <p:cSld>
     <p:spTree>
@@ -4246,201 +4530,40 @@
           </a:p>
         </p:txBody>
       </p:sp>
+      <p:sp>
+        <p:nvSpPr>
+          <p:cNvPr id="8" name="TextBox 7"/>
+          <p:cNvSpPr txBox="1"/>
+          <p:nvPr/>
+        </p:nvSpPr>
+        <p:spPr>
+          <a:xfrm>
+            <a:off x="4276098" y="6201598"/>
+            <a:ext cx="896399" cy="215444"/>
+          </a:xfrm>
+          <a:prstGeom prst="rect">
+            <a:avLst/>
+          </a:prstGeom>
+          <a:noFill/>
+        </p:spPr>
+        <p:txBody>
+          <a:bodyPr wrap="none" rtlCol="0">
+            <a:spAutoFit/>
+          </a:bodyPr>
+          <a:lstStyle/>
+          <a:p>
+            <a:r>
+              <a:rPr lang="de-DE" sz="800" dirty="0" smtClean="0"/>
+              <a:t>Quelle: Furtuna</a:t>
+            </a:r>
+            <a:endParaRPr lang="de-DE" sz="800" dirty="0"/>
+          </a:p>
+        </p:txBody>
+      </p:sp>
     </p:spTree>
     <p:extLst>
       <p:ext uri="{BB962C8B-B14F-4D97-AF65-F5344CB8AC3E}">
         <p14:creationId xmlns:p14="http://schemas.microsoft.com/office/powerpoint/2010/main" val="1283500121"/>
-      </p:ext>
-    </p:extLst>
-  </p:cSld>
-  <p:clrMapOvr>
-    <a:masterClrMapping/>
-  </p:clrMapOvr>
-  <p:timing>
-    <p:tnLst>
-      <p:par>
-        <p:cTn id="1" dur="indefinite" restart="never" nodeType="tmRoot"/>
-      </p:par>
-    </p:tnLst>
-  </p:timing>
-</p:sld>
-</file>
-
-<file path=ppt/slides/slide12.xml><?xml version="1.0" encoding="utf-8"?>
-<p:sld xmlns:a="http://schemas.openxmlformats.org/drawingml/2006/main" xmlns:r="http://schemas.openxmlformats.org/officeDocument/2006/relationships" xmlns:p="http://schemas.openxmlformats.org/presentationml/2006/main">
-  <p:cSld>
-    <p:spTree>
-      <p:nvGrpSpPr>
-        <p:cNvPr id="1" name=""/>
-        <p:cNvGrpSpPr/>
-        <p:nvPr/>
-      </p:nvGrpSpPr>
-      <p:grpSpPr>
-        <a:xfrm>
-          <a:off x="0" y="0"/>
-          <a:ext cx="0" cy="0"/>
-          <a:chOff x="0" y="0"/>
-          <a:chExt cx="0" cy="0"/>
-        </a:xfrm>
-      </p:grpSpPr>
-      <p:sp>
-        <p:nvSpPr>
-          <p:cNvPr id="2" name="Title 1"/>
-          <p:cNvSpPr>
-            <a:spLocks noGrp="1"/>
-          </p:cNvSpPr>
-          <p:nvPr>
-            <p:ph type="title"/>
-          </p:nvPr>
-        </p:nvSpPr>
-        <p:spPr/>
-        <p:txBody>
-          <a:bodyPr>
-            <a:normAutofit/>
-          </a:bodyPr>
-          <a:lstStyle/>
-          <a:p>
-            <a:r>
-              <a:rPr lang="de-DE" dirty="0" smtClean="0"/>
-              <a:t>Optisch vs elektrisch</a:t>
-            </a:r>
-            <a:endParaRPr lang="de-DE" dirty="0"/>
-          </a:p>
-        </p:txBody>
-      </p:sp>
-      <p:sp>
-        <p:nvSpPr>
-          <p:cNvPr id="7" name="Text Placeholder 6"/>
-          <p:cNvSpPr>
-            <a:spLocks noGrp="1"/>
-          </p:cNvSpPr>
-          <p:nvPr>
-            <p:ph type="body" idx="1"/>
-          </p:nvPr>
-        </p:nvSpPr>
-        <p:spPr/>
-        <p:txBody>
-          <a:bodyPr/>
-          <a:lstStyle/>
-          <a:p>
-            <a:r>
-              <a:rPr lang="de-DE" dirty="0" smtClean="0"/>
-              <a:t>Optisch</a:t>
-            </a:r>
-            <a:endParaRPr lang="de-DE" dirty="0"/>
-          </a:p>
-        </p:txBody>
-      </p:sp>
-      <p:sp>
-        <p:nvSpPr>
-          <p:cNvPr id="3" name="Content Placeholder 2"/>
-          <p:cNvSpPr>
-            <a:spLocks noGrp="1"/>
-          </p:cNvSpPr>
-          <p:nvPr>
-            <p:ph sz="half" idx="2"/>
-          </p:nvPr>
-        </p:nvSpPr>
-        <p:spPr/>
-        <p:txBody>
-          <a:bodyPr/>
-          <a:lstStyle/>
-          <a:p>
-            <a:r>
-              <a:rPr lang="de-DE" dirty="0" smtClean="0"/>
-              <a:t>Genauigkeit</a:t>
-            </a:r>
-          </a:p>
-          <a:p>
-            <a:r>
-              <a:rPr lang="de-DE" dirty="0" smtClean="0"/>
-              <a:t>Zuverlässigkeit</a:t>
-            </a:r>
-          </a:p>
-          <a:p>
-            <a:endParaRPr lang="de-DE" dirty="0"/>
-          </a:p>
-          <a:p>
-            <a:pPr>
-              <a:buFont typeface="Symbol" pitchFamily="18" charset="2"/>
-              <a:buChar char="-"/>
-            </a:pPr>
-            <a:r>
-              <a:rPr lang="de-DE" dirty="0" smtClean="0"/>
-              <a:t>Optischer Zugang nötig</a:t>
-            </a:r>
-          </a:p>
-        </p:txBody>
-      </p:sp>
-      <p:sp>
-        <p:nvSpPr>
-          <p:cNvPr id="8" name="Text Placeholder 7"/>
-          <p:cNvSpPr>
-            <a:spLocks noGrp="1"/>
-          </p:cNvSpPr>
-          <p:nvPr>
-            <p:ph type="body" sz="quarter" idx="3"/>
-          </p:nvPr>
-        </p:nvSpPr>
-        <p:spPr/>
-        <p:txBody>
-          <a:bodyPr/>
-          <a:lstStyle/>
-          <a:p>
-            <a:r>
-              <a:rPr lang="de-DE" dirty="0" smtClean="0"/>
-              <a:t>Elektrisch (kapazitiv)</a:t>
-            </a:r>
-            <a:endParaRPr lang="de-DE" dirty="0"/>
-          </a:p>
-        </p:txBody>
-      </p:sp>
-      <p:sp>
-        <p:nvSpPr>
-          <p:cNvPr id="9" name="Content Placeholder 8"/>
-          <p:cNvSpPr>
-            <a:spLocks noGrp="1"/>
-          </p:cNvSpPr>
-          <p:nvPr>
-            <p:ph sz="quarter" idx="4"/>
-          </p:nvPr>
-        </p:nvSpPr>
-        <p:spPr/>
-        <p:txBody>
-          <a:bodyPr/>
-          <a:lstStyle/>
-          <a:p>
-            <a:r>
-              <a:rPr lang="de-DE" dirty="0" smtClean="0"/>
-              <a:t>Metall-Metall Kontakt</a:t>
-            </a:r>
-          </a:p>
-          <a:p>
-            <a:r>
-              <a:rPr lang="de-DE" dirty="0" smtClean="0"/>
-              <a:t>Einfacher Aufbau</a:t>
-            </a:r>
-          </a:p>
-          <a:p>
-            <a:endParaRPr lang="de-DE" dirty="0"/>
-          </a:p>
-          <a:p>
-            <a:pPr>
-              <a:buFont typeface="Symbol" pitchFamily="18" charset="2"/>
-              <a:buChar char="-"/>
-            </a:pPr>
-            <a:r>
-              <a:rPr lang="de-DE" dirty="0" smtClean="0"/>
-              <a:t>Parameterschwankung von verschiedenen Schmierungen</a:t>
-            </a:r>
-            <a:endParaRPr lang="de-DE" dirty="0"/>
-          </a:p>
-        </p:txBody>
-      </p:sp>
-    </p:spTree>
-    <p:extLst>
-      <p:ext uri="{BB962C8B-B14F-4D97-AF65-F5344CB8AC3E}">
-        <p14:creationId xmlns:p14="http://schemas.microsoft.com/office/powerpoint/2010/main" val="1894591889"/>
       </p:ext>
     </p:extLst>
   </p:cSld>
@@ -4476,7 +4599,7 @@
       </p:grpSpPr>
       <p:sp>
         <p:nvSpPr>
-          <p:cNvPr id="8" name="Title 7"/>
+          <p:cNvPr id="2" name="Title 1"/>
           <p:cNvSpPr>
             <a:spLocks noGrp="1"/>
           </p:cNvSpPr>
@@ -4486,6 +4609,197 @@
         </p:nvSpPr>
         <p:spPr/>
         <p:txBody>
+          <a:bodyPr>
+            <a:normAutofit/>
+          </a:bodyPr>
+          <a:lstStyle/>
+          <a:p>
+            <a:r>
+              <a:rPr lang="de-DE" dirty="0" smtClean="0"/>
+              <a:t>Optisch vs elektrisch</a:t>
+            </a:r>
+            <a:endParaRPr lang="de-DE" dirty="0"/>
+          </a:p>
+        </p:txBody>
+      </p:sp>
+      <p:sp>
+        <p:nvSpPr>
+          <p:cNvPr id="7" name="Text Placeholder 6"/>
+          <p:cNvSpPr>
+            <a:spLocks noGrp="1"/>
+          </p:cNvSpPr>
+          <p:nvPr>
+            <p:ph type="body" idx="1"/>
+          </p:nvPr>
+        </p:nvSpPr>
+        <p:spPr/>
+        <p:txBody>
+          <a:bodyPr/>
+          <a:lstStyle/>
+          <a:p>
+            <a:r>
+              <a:rPr lang="de-DE" dirty="0" smtClean="0"/>
+              <a:t>Optisch</a:t>
+            </a:r>
+            <a:endParaRPr lang="de-DE" dirty="0"/>
+          </a:p>
+        </p:txBody>
+      </p:sp>
+      <p:sp>
+        <p:nvSpPr>
+          <p:cNvPr id="3" name="Content Placeholder 2"/>
+          <p:cNvSpPr>
+            <a:spLocks noGrp="1"/>
+          </p:cNvSpPr>
+          <p:nvPr>
+            <p:ph sz="half" idx="2"/>
+          </p:nvPr>
+        </p:nvSpPr>
+        <p:spPr/>
+        <p:txBody>
+          <a:bodyPr/>
+          <a:lstStyle/>
+          <a:p>
+            <a:r>
+              <a:rPr lang="de-DE" dirty="0" smtClean="0"/>
+              <a:t>Genauigkeit</a:t>
+            </a:r>
+          </a:p>
+          <a:p>
+            <a:r>
+              <a:rPr lang="de-DE" dirty="0" smtClean="0"/>
+              <a:t>Zuverlässigkeit</a:t>
+            </a:r>
+          </a:p>
+          <a:p>
+            <a:endParaRPr lang="de-DE" dirty="0"/>
+          </a:p>
+          <a:p>
+            <a:pPr>
+              <a:buFont typeface="Symbol" pitchFamily="18" charset="2"/>
+              <a:buChar char="-"/>
+            </a:pPr>
+            <a:r>
+              <a:rPr lang="de-DE" dirty="0" smtClean="0"/>
+              <a:t>Optischer Zugang nötig</a:t>
+            </a:r>
+          </a:p>
+        </p:txBody>
+      </p:sp>
+      <p:sp>
+        <p:nvSpPr>
+          <p:cNvPr id="8" name="Text Placeholder 7"/>
+          <p:cNvSpPr>
+            <a:spLocks noGrp="1"/>
+          </p:cNvSpPr>
+          <p:nvPr>
+            <p:ph type="body" sz="quarter" idx="3"/>
+          </p:nvPr>
+        </p:nvSpPr>
+        <p:spPr/>
+        <p:txBody>
+          <a:bodyPr/>
+          <a:lstStyle/>
+          <a:p>
+            <a:r>
+              <a:rPr lang="de-DE" dirty="0" smtClean="0"/>
+              <a:t>Elektrisch (kapazitiv)</a:t>
+            </a:r>
+            <a:endParaRPr lang="de-DE" dirty="0"/>
+          </a:p>
+        </p:txBody>
+      </p:sp>
+      <p:sp>
+        <p:nvSpPr>
+          <p:cNvPr id="9" name="Content Placeholder 8"/>
+          <p:cNvSpPr>
+            <a:spLocks noGrp="1"/>
+          </p:cNvSpPr>
+          <p:nvPr>
+            <p:ph sz="quarter" idx="4"/>
+          </p:nvPr>
+        </p:nvSpPr>
+        <p:spPr/>
+        <p:txBody>
+          <a:bodyPr/>
+          <a:lstStyle/>
+          <a:p>
+            <a:r>
+              <a:rPr lang="de-DE" dirty="0" smtClean="0"/>
+              <a:t>Metall-Metall Kontakt</a:t>
+            </a:r>
+          </a:p>
+          <a:p>
+            <a:r>
+              <a:rPr lang="de-DE" dirty="0" smtClean="0"/>
+              <a:t>Einfacher Aufbau</a:t>
+            </a:r>
+          </a:p>
+          <a:p>
+            <a:endParaRPr lang="de-DE" dirty="0"/>
+          </a:p>
+          <a:p>
+            <a:pPr>
+              <a:buFont typeface="Symbol" pitchFamily="18" charset="2"/>
+              <a:buChar char="-"/>
+            </a:pPr>
+            <a:r>
+              <a:rPr lang="de-DE" dirty="0" smtClean="0"/>
+              <a:t>Parameterschwankung von verschiedenen Schmierungen</a:t>
+            </a:r>
+            <a:endParaRPr lang="de-DE" dirty="0"/>
+          </a:p>
+        </p:txBody>
+      </p:sp>
+    </p:spTree>
+    <p:extLst>
+      <p:ext uri="{BB962C8B-B14F-4D97-AF65-F5344CB8AC3E}">
+        <p14:creationId xmlns:p14="http://schemas.microsoft.com/office/powerpoint/2010/main" val="1894591889"/>
+      </p:ext>
+    </p:extLst>
+  </p:cSld>
+  <p:clrMapOvr>
+    <a:masterClrMapping/>
+  </p:clrMapOvr>
+  <p:timing>
+    <p:tnLst>
+      <p:par>
+        <p:cTn id="1" dur="indefinite" restart="never" nodeType="tmRoot"/>
+      </p:par>
+    </p:tnLst>
+  </p:timing>
+</p:sld>
+</file>
+
+<file path=ppt/slides/slide14.xml><?xml version="1.0" encoding="utf-8"?>
+<p:sld xmlns:a="http://schemas.openxmlformats.org/drawingml/2006/main" xmlns:r="http://schemas.openxmlformats.org/officeDocument/2006/relationships" xmlns:p="http://schemas.openxmlformats.org/presentationml/2006/main">
+  <p:cSld>
+    <p:spTree>
+      <p:nvGrpSpPr>
+        <p:cNvPr id="1" name=""/>
+        <p:cNvGrpSpPr/>
+        <p:nvPr/>
+      </p:nvGrpSpPr>
+      <p:grpSpPr>
+        <a:xfrm>
+          <a:off x="0" y="0"/>
+          <a:ext cx="0" cy="0"/>
+          <a:chOff x="0" y="0"/>
+          <a:chExt cx="0" cy="0"/>
+        </a:xfrm>
+      </p:grpSpPr>
+      <p:sp>
+        <p:nvSpPr>
+          <p:cNvPr id="8" name="Title 7"/>
+          <p:cNvSpPr>
+            <a:spLocks noGrp="1"/>
+          </p:cNvSpPr>
+          <p:nvPr>
+            <p:ph type="title"/>
+          </p:nvPr>
+        </p:nvSpPr>
+        <p:spPr/>
+        <p:txBody>
           <a:bodyPr/>
           <a:lstStyle/>
           <a:p>
@@ -4514,21 +4828,14 @@
           <a:p>
             <a:r>
               <a:rPr lang="de-DE" dirty="0" smtClean="0"/>
-              <a:t>Quatitative Messung der Schmierfilmdicke mittels kapazitiven Methode </a:t>
+              <a:t>Korrelation zwischen optischer und elektrischer Messmethode</a:t>
             </a:r>
           </a:p>
           <a:p>
             <a:r>
               <a:rPr lang="de-DE" dirty="0" smtClean="0"/>
-              <a:t>Einflussfaktoren, die die Kapazitätmessung beeinflussen</a:t>
-            </a:r>
-          </a:p>
-          <a:p>
-            <a:r>
-              <a:rPr lang="de-DE" dirty="0" smtClean="0"/>
-              <a:t>Eine generelle Methode zur Evaluation der Filmdicke mittels Kapazität</a:t>
-            </a:r>
-            <a:endParaRPr lang="de-DE" dirty="0"/>
+              <a:t>Einflussfaktoren, Störfaktoren der Kapazitätmessung</a:t>
+            </a:r>
           </a:p>
         </p:txBody>
       </p:sp>
@@ -4571,7 +4878,7 @@
 </p:sld>
 </file>
 
-<file path=ppt/slides/slide14.xml><?xml version="1.0" encoding="utf-8"?>
+<file path=ppt/slides/slide15.xml><?xml version="1.0" encoding="utf-8"?>
 <p:sld xmlns:a="http://schemas.openxmlformats.org/drawingml/2006/main" xmlns:r="http://schemas.openxmlformats.org/officeDocument/2006/relationships" xmlns:p="http://schemas.openxmlformats.org/presentationml/2006/main">
   <p:cSld>
     <p:spTree>
@@ -4727,6 +5034,39 @@
           </a:p>
         </p:txBody>
       </p:sp>
+      <p:sp>
+        <p:nvSpPr>
+          <p:cNvPr id="6" name="TextBox 5"/>
+          <p:cNvSpPr txBox="1"/>
+          <p:nvPr/>
+        </p:nvSpPr>
+        <p:spPr>
+          <a:xfrm>
+            <a:off x="6012160" y="6192199"/>
+            <a:ext cx="1925527" cy="215444"/>
+          </a:xfrm>
+          <a:prstGeom prst="rect">
+            <a:avLst/>
+          </a:prstGeom>
+          <a:noFill/>
+        </p:spPr>
+        <p:txBody>
+          <a:bodyPr wrap="none" rtlCol="0">
+            <a:spAutoFit/>
+          </a:bodyPr>
+          <a:lstStyle/>
+          <a:p>
+            <a:r>
+              <a:rPr lang="de-DE" sz="800" dirty="0" smtClean="0"/>
+              <a:t>Quelle: Jablonka</a:t>
+            </a:r>
+            <a:r>
+              <a:rPr lang="de-DE" sz="800" dirty="0"/>
+              <a:t>, Glovnea, Bongaerts</a:t>
+            </a:r>
+          </a:p>
+        </p:txBody>
+      </p:sp>
     </p:spTree>
     <p:extLst>
       <p:ext uri="{BB962C8B-B14F-4D97-AF65-F5344CB8AC3E}">
@@ -4747,7 +5087,7 @@
 </p:sld>
 </file>
 
-<file path=ppt/slides/slide15.xml><?xml version="1.0" encoding="utf-8"?>
+<file path=ppt/slides/slide16.xml><?xml version="1.0" encoding="utf-8"?>
 <p:sld xmlns:a="http://schemas.openxmlformats.org/drawingml/2006/main" xmlns:r="http://schemas.openxmlformats.org/officeDocument/2006/relationships" xmlns:p="http://schemas.openxmlformats.org/presentationml/2006/main">
   <p:cSld>
     <p:spTree>
@@ -5105,7 +5445,7 @@
             </a:pPr>
             <a:r>
               <a:rPr lang="de-DE" dirty="0" smtClean="0"/>
-              <a:t>Dicke die Beschichtung</a:t>
+              <a:t>Dicke der Beschichtung</a:t>
             </a:r>
           </a:p>
           <a:p>
@@ -5115,7 +5455,7 @@
             </a:pPr>
             <a:r>
               <a:rPr lang="de-DE" dirty="0" smtClean="0"/>
-              <a:t>Kugel über die Kante</a:t>
+              <a:t>Kugel über der Kante</a:t>
             </a:r>
           </a:p>
           <a:p>
@@ -5173,10 +5513,159 @@
           </a:p>
         </p:txBody>
       </p:sp>
+      <p:sp>
+        <p:nvSpPr>
+          <p:cNvPr id="11" name="TextBox 10"/>
+          <p:cNvSpPr txBox="1"/>
+          <p:nvPr/>
+        </p:nvSpPr>
+        <p:spPr>
+          <a:xfrm>
+            <a:off x="4316047" y="4247633"/>
+            <a:ext cx="896399" cy="215444"/>
+          </a:xfrm>
+          <a:prstGeom prst="rect">
+            <a:avLst/>
+          </a:prstGeom>
+          <a:noFill/>
+        </p:spPr>
+        <p:txBody>
+          <a:bodyPr wrap="none" rtlCol="0">
+            <a:spAutoFit/>
+          </a:bodyPr>
+          <a:lstStyle/>
+          <a:p>
+            <a:r>
+              <a:rPr lang="de-DE" sz="800" dirty="0" smtClean="0"/>
+              <a:t>Quelle: Furtuna</a:t>
+            </a:r>
+            <a:endParaRPr lang="de-DE" sz="800" dirty="0"/>
+          </a:p>
+        </p:txBody>
+      </p:sp>
     </p:spTree>
     <p:extLst>
       <p:ext uri="{BB962C8B-B14F-4D97-AF65-F5344CB8AC3E}">
         <p14:creationId xmlns:p14="http://schemas.microsoft.com/office/powerpoint/2010/main" val="835252188"/>
+      </p:ext>
+    </p:extLst>
+  </p:cSld>
+  <p:clrMapOvr>
+    <a:masterClrMapping/>
+  </p:clrMapOvr>
+  <p:timing>
+    <p:tnLst>
+      <p:par>
+        <p:cTn id="1" dur="indefinite" restart="never" nodeType="tmRoot"/>
+      </p:par>
+    </p:tnLst>
+  </p:timing>
+</p:sld>
+</file>
+
+<file path=ppt/slides/slide17.xml><?xml version="1.0" encoding="utf-8"?>
+<p:sld xmlns:a="http://schemas.openxmlformats.org/drawingml/2006/main" xmlns:r="http://schemas.openxmlformats.org/officeDocument/2006/relationships" xmlns:p="http://schemas.openxmlformats.org/presentationml/2006/main">
+  <p:cSld>
+    <p:spTree>
+      <p:nvGrpSpPr>
+        <p:cNvPr id="1" name=""/>
+        <p:cNvGrpSpPr/>
+        <p:nvPr/>
+      </p:nvGrpSpPr>
+      <p:grpSpPr>
+        <a:xfrm>
+          <a:off x="0" y="0"/>
+          <a:ext cx="0" cy="0"/>
+          <a:chOff x="0" y="0"/>
+          <a:chExt cx="0" cy="0"/>
+        </a:xfrm>
+      </p:grpSpPr>
+      <p:sp>
+        <p:nvSpPr>
+          <p:cNvPr id="2" name="Title 1"/>
+          <p:cNvSpPr>
+            <a:spLocks noGrp="1"/>
+          </p:cNvSpPr>
+          <p:nvPr>
+            <p:ph type="title"/>
+          </p:nvPr>
+        </p:nvSpPr>
+        <p:spPr/>
+        <p:txBody>
+          <a:bodyPr/>
+          <a:lstStyle/>
+          <a:p>
+            <a:r>
+              <a:rPr lang="de-DE" dirty="0" smtClean="0"/>
+              <a:t>Zusammenfassung</a:t>
+            </a:r>
+            <a:endParaRPr lang="de-DE" dirty="0"/>
+          </a:p>
+        </p:txBody>
+      </p:sp>
+      <p:sp>
+        <p:nvSpPr>
+          <p:cNvPr id="8" name="Content Placeholder 7"/>
+          <p:cNvSpPr>
+            <a:spLocks noGrp="1"/>
+          </p:cNvSpPr>
+          <p:nvPr>
+            <p:ph idx="1"/>
+          </p:nvPr>
+        </p:nvSpPr>
+        <p:spPr/>
+        <p:txBody>
+          <a:bodyPr/>
+          <a:lstStyle/>
+          <a:p>
+            <a:r>
+              <a:rPr lang="de-DE" dirty="0" smtClean="0"/>
+              <a:t>EHD – Schmierfilmdicke</a:t>
+            </a:r>
+          </a:p>
+          <a:p>
+            <a:r>
+              <a:rPr lang="de-DE" dirty="0" smtClean="0"/>
+              <a:t>Methoden zur Schmierfilmdickenmessung</a:t>
+            </a:r>
+          </a:p>
+          <a:p>
+            <a:r>
+              <a:rPr lang="de-DE" dirty="0" smtClean="0"/>
+              <a:t>Ziel: Prüfung der Genauigkeit von kapazitiven Messungen</a:t>
+            </a:r>
+          </a:p>
+          <a:p>
+            <a:r>
+              <a:rPr lang="de-DE" dirty="0" smtClean="0"/>
+              <a:t>Probleme und Vorgehensweise für die Messung</a:t>
+            </a:r>
+          </a:p>
+        </p:txBody>
+      </p:sp>
+      <p:sp>
+        <p:nvSpPr>
+          <p:cNvPr id="7" name="Footer Placeholder 6"/>
+          <p:cNvSpPr>
+            <a:spLocks noGrp="1"/>
+          </p:cNvSpPr>
+          <p:nvPr>
+            <p:ph type="ftr" sz="quarter" idx="11"/>
+          </p:nvPr>
+        </p:nvSpPr>
+        <p:spPr/>
+        <p:txBody>
+          <a:bodyPr/>
+          <a:lstStyle/>
+          <a:p>
+            <a:endParaRPr lang="de-DE"/>
+          </a:p>
+        </p:txBody>
+      </p:sp>
+    </p:spTree>
+    <p:extLst>
+      <p:ext uri="{BB962C8B-B14F-4D97-AF65-F5344CB8AC3E}">
+        <p14:creationId xmlns:p14="http://schemas.microsoft.com/office/powerpoint/2010/main" val="3242919981"/>
       </p:ext>
     </p:extLst>
   </p:cSld>
@@ -5251,13 +5740,13 @@
           <a:p>
             <a:r>
               <a:rPr lang="de-DE" dirty="0" smtClean="0"/>
-              <a:t>Was ist EHD?</a:t>
+              <a:t>EHD</a:t>
             </a:r>
           </a:p>
           <a:p>
             <a:r>
               <a:rPr lang="de-DE" dirty="0" smtClean="0"/>
-              <a:t>Messung der Filmdicke</a:t>
+              <a:t>Methoden zur Schmierfilmdickenmessung</a:t>
             </a:r>
           </a:p>
           <a:p>
@@ -5393,7 +5882,7 @@
           <a:p>
             <a:r>
               <a:rPr lang="de-DE" dirty="0" smtClean="0"/>
-              <a:t>Was ist EHD</a:t>
+              <a:t>Was ist EHD?</a:t>
             </a:r>
             <a:endParaRPr lang="de-DE" dirty="0"/>
           </a:p>
@@ -5485,6 +5974,39 @@
               <a:t>Weich EHD (Reifen, RWDR)</a:t>
             </a:r>
             <a:endParaRPr lang="de-DE" dirty="0"/>
+          </a:p>
+        </p:txBody>
+      </p:sp>
+      <p:sp>
+        <p:nvSpPr>
+          <p:cNvPr id="4" name="TextBox 3"/>
+          <p:cNvSpPr txBox="1"/>
+          <p:nvPr/>
+        </p:nvSpPr>
+        <p:spPr>
+          <a:xfrm>
+            <a:off x="6300192" y="5913856"/>
+            <a:ext cx="1925527" cy="215444"/>
+          </a:xfrm>
+          <a:prstGeom prst="rect">
+            <a:avLst/>
+          </a:prstGeom>
+          <a:noFill/>
+        </p:spPr>
+        <p:txBody>
+          <a:bodyPr wrap="none" rtlCol="0">
+            <a:spAutoFit/>
+          </a:bodyPr>
+          <a:lstStyle/>
+          <a:p>
+            <a:r>
+              <a:rPr lang="de-DE" sz="800" dirty="0" smtClean="0"/>
+              <a:t>Quelle: Jablonka</a:t>
+            </a:r>
+            <a:r>
+              <a:rPr lang="de-DE" sz="800" dirty="0"/>
+              <a:t>, Glovnea, Bongaerts</a:t>
+            </a:r>
           </a:p>
         </p:txBody>
       </p:sp>
@@ -5541,12 +6063,8 @@
           <a:lstStyle/>
           <a:p>
             <a:r>
-              <a:rPr lang="en-US" dirty="0" smtClean="0"/>
-              <a:t>EHD </a:t>
-            </a:r>
-            <a:r>
               <a:rPr lang="en-US" dirty="0" err="1" smtClean="0"/>
-              <a:t>Filmdicke</a:t>
+              <a:t>Reibungsmodell</a:t>
             </a:r>
             <a:endParaRPr lang="de-DE" dirty="0"/>
           </a:p>
@@ -5734,6 +6252,36 @@
           </a:p>
         </p:txBody>
       </p:sp>
+      <p:sp>
+        <p:nvSpPr>
+          <p:cNvPr id="7" name="TextBox 6"/>
+          <p:cNvSpPr txBox="1"/>
+          <p:nvPr/>
+        </p:nvSpPr>
+        <p:spPr>
+          <a:xfrm>
+            <a:off x="143512" y="5697542"/>
+            <a:ext cx="482824" cy="215444"/>
+          </a:xfrm>
+          <a:prstGeom prst="rect">
+            <a:avLst/>
+          </a:prstGeom>
+          <a:noFill/>
+        </p:spPr>
+        <p:txBody>
+          <a:bodyPr wrap="none" rtlCol="0">
+            <a:spAutoFit/>
+          </a:bodyPr>
+          <a:lstStyle/>
+          <a:p>
+            <a:r>
+              <a:rPr lang="de-DE" sz="800" dirty="0" smtClean="0"/>
+              <a:t>Quelle</a:t>
+            </a:r>
+            <a:endParaRPr lang="de-DE" sz="800" dirty="0"/>
+          </a:p>
+        </p:txBody>
+      </p:sp>
     </p:spTree>
     <p:extLst>
       <p:ext uri="{BB962C8B-B14F-4D97-AF65-F5344CB8AC3E}">
@@ -5779,7 +6327,7 @@
         </p:nvSpPr>
         <p:spPr bwMode="auto">
           <a:xfrm>
-            <a:off x="539552" y="4077072"/>
+            <a:off x="467544" y="3429000"/>
             <a:ext cx="3420380" cy="468052"/>
           </a:xfrm>
           <a:prstGeom prst="rect">
@@ -5855,7 +6403,7 @@
           <a:p>
             <a:r>
               <a:rPr lang="de-DE" dirty="0" smtClean="0"/>
-              <a:t>Vorhersagen des Risikos von Oberflächenschaden</a:t>
+              <a:t>Wichtigkeit der Schmierfilmdicke</a:t>
             </a:r>
             <a:endParaRPr lang="de-DE" dirty="0"/>
           </a:p>
@@ -5883,38 +6431,21 @@
           <a:p>
             <a:r>
               <a:rPr lang="de-DE" dirty="0" smtClean="0"/>
-              <a:t>Platische Verformung</a:t>
-            </a:r>
-          </a:p>
-          <a:p>
-            <a:pPr lvl="1">
-              <a:buFont typeface="Symbol" pitchFamily="18" charset="2"/>
-              <a:buChar char="-"/>
-            </a:pPr>
-            <a:r>
-              <a:rPr lang="de-DE" dirty="0"/>
-              <a:t>h</a:t>
-            </a:r>
-            <a:r>
-              <a:rPr lang="de-DE" dirty="0" smtClean="0"/>
-              <a:t>ohe Belastung</a:t>
-            </a:r>
-            <a:endParaRPr lang="de-DE" dirty="0"/>
+              <a:t>Hohe Belastung -&gt; plastische Verformung</a:t>
+            </a:r>
           </a:p>
           <a:p>
             <a:r>
               <a:rPr lang="de-DE" dirty="0" smtClean="0"/>
               <a:t>Kontaktermüdung</a:t>
             </a:r>
-          </a:p>
-          <a:p>
-            <a:pPr lvl="1">
-              <a:buFont typeface="Symbol" pitchFamily="18" charset="2"/>
-              <a:buChar char="-"/>
-            </a:pPr>
+            <a:r>
+              <a:rPr lang="de-DE" dirty="0"/>
+              <a:t> </a:t>
+            </a:r>
             <a:r>
               <a:rPr lang="de-DE" dirty="0" smtClean="0"/>
-              <a:t>pitting, micro pitting</a:t>
+              <a:t>-&gt; pitting, micro pitting</a:t>
             </a:r>
           </a:p>
           <a:p>
@@ -6036,7 +6567,11 @@
           <a:p>
             <a:r>
               <a:rPr lang="de-DE" dirty="0" smtClean="0"/>
-              <a:t>Messung der Filmdicke</a:t>
+              <a:t>Messung der </a:t>
+            </a:r>
+            <a:r>
+              <a:rPr lang="de-DE" dirty="0" smtClean="0"/>
+              <a:t>Schmierfilmdicke</a:t>
             </a:r>
             <a:endParaRPr lang="de-DE" dirty="0"/>
           </a:p>
@@ -6104,6 +6639,206 @@
 </file>
 
 <file path=ppt/slides/slide7.xml><?xml version="1.0" encoding="utf-8"?>
+<p:sld xmlns:a="http://schemas.openxmlformats.org/drawingml/2006/main" xmlns:r="http://schemas.openxmlformats.org/officeDocument/2006/relationships" xmlns:p="http://schemas.openxmlformats.org/presentationml/2006/main">
+  <p:cSld>
+    <p:spTree>
+      <p:nvGrpSpPr>
+        <p:cNvPr id="1" name=""/>
+        <p:cNvGrpSpPr/>
+        <p:nvPr/>
+      </p:nvGrpSpPr>
+      <p:grpSpPr>
+        <a:xfrm>
+          <a:off x="0" y="0"/>
+          <a:ext cx="0" cy="0"/>
+          <a:chOff x="0" y="0"/>
+          <a:chExt cx="0" cy="0"/>
+        </a:xfrm>
+      </p:grpSpPr>
+      <p:sp>
+        <p:nvSpPr>
+          <p:cNvPr id="2" name="Title 1"/>
+          <p:cNvSpPr>
+            <a:spLocks noGrp="1"/>
+          </p:cNvSpPr>
+          <p:nvPr>
+            <p:ph type="title"/>
+          </p:nvPr>
+        </p:nvSpPr>
+        <p:spPr/>
+        <p:txBody>
+          <a:bodyPr/>
+          <a:lstStyle/>
+          <a:p>
+            <a:r>
+              <a:rPr lang="en-US" dirty="0" err="1" smtClean="0"/>
+              <a:t>Optische</a:t>
+            </a:r>
+            <a:r>
+              <a:rPr lang="en-US" dirty="0" smtClean="0"/>
+              <a:t> </a:t>
+            </a:r>
+            <a:r>
+              <a:rPr lang="en-US" dirty="0" err="1" smtClean="0"/>
+              <a:t>Interferometrie</a:t>
+            </a:r>
+            <a:endParaRPr lang="de-DE" dirty="0"/>
+          </a:p>
+        </p:txBody>
+      </p:sp>
+      <p:sp>
+        <p:nvSpPr>
+          <p:cNvPr id="3" name="Content Placeholder 2"/>
+          <p:cNvSpPr>
+            <a:spLocks noGrp="1"/>
+          </p:cNvSpPr>
+          <p:nvPr>
+            <p:ph idx="1"/>
+          </p:nvPr>
+        </p:nvSpPr>
+        <p:spPr/>
+        <p:txBody>
+          <a:bodyPr/>
+          <a:lstStyle/>
+          <a:p>
+            <a:endParaRPr lang="de-DE" dirty="0"/>
+          </a:p>
+        </p:txBody>
+      </p:sp>
+      <p:sp>
+        <p:nvSpPr>
+          <p:cNvPr id="4" name="Footer Placeholder 3"/>
+          <p:cNvSpPr>
+            <a:spLocks noGrp="1"/>
+          </p:cNvSpPr>
+          <p:nvPr>
+            <p:ph type="ftr" sz="quarter" idx="11"/>
+          </p:nvPr>
+        </p:nvSpPr>
+        <p:spPr/>
+        <p:txBody>
+          <a:bodyPr/>
+          <a:lstStyle/>
+          <a:p>
+            <a:endParaRPr lang="de-DE"/>
+          </a:p>
+        </p:txBody>
+      </p:sp>
+      <p:pic>
+        <p:nvPicPr>
+          <p:cNvPr id="1026" name="Picture 2"/>
+          <p:cNvPicPr>
+            <a:picLocks noChangeAspect="1" noChangeArrowheads="1"/>
+          </p:cNvPicPr>
+          <p:nvPr/>
+        </p:nvPicPr>
+        <p:blipFill>
+          <a:blip r:embed="rId2">
+            <a:extLst>
+              <a:ext uri="{28A0092B-C50C-407E-A947-70E740481C1C}">
+                <a14:useLocalDpi xmlns:a14="http://schemas.microsoft.com/office/drawing/2010/main" val="0"/>
+              </a:ext>
+            </a:extLst>
+          </a:blip>
+          <a:srcRect/>
+          <a:stretch>
+            <a:fillRect/>
+          </a:stretch>
+        </p:blipFill>
+        <p:spPr bwMode="auto">
+          <a:xfrm>
+            <a:off x="1617540" y="1412776"/>
+            <a:ext cx="5908920" cy="4865179"/>
+          </a:xfrm>
+          <a:prstGeom prst="rect">
+            <a:avLst/>
+          </a:prstGeom>
+          <a:noFill/>
+          <a:ln>
+            <a:noFill/>
+          </a:ln>
+          <a:effectLst/>
+          <a:extLst>
+            <a:ext uri="{909E8E84-426E-40DD-AFC4-6F175D3DCCD1}">
+              <a14:hiddenFill xmlns:a14="http://schemas.microsoft.com/office/drawing/2010/main">
+                <a:solidFill>
+                  <a:schemeClr val="accent1"/>
+                </a:solidFill>
+              </a14:hiddenFill>
+            </a:ext>
+            <a:ext uri="{91240B29-F687-4F45-9708-019B960494DF}">
+              <a14:hiddenLine xmlns:a14="http://schemas.microsoft.com/office/drawing/2010/main" w="9525">
+                <a:solidFill>
+                  <a:schemeClr val="tx1"/>
+                </a:solidFill>
+                <a:miter lim="800000"/>
+                <a:headEnd/>
+                <a:tailEnd/>
+              </a14:hiddenLine>
+            </a:ext>
+            <a:ext uri="{AF507438-7753-43E0-B8FC-AC1667EBCBE1}">
+              <a14:hiddenEffects xmlns:a14="http://schemas.microsoft.com/office/drawing/2010/main">
+                <a:effectLst>
+                  <a:outerShdw dist="35921" dir="2700000" algn="ctr" rotWithShape="0">
+                    <a:schemeClr val="bg2"/>
+                  </a:outerShdw>
+                </a:effectLst>
+              </a14:hiddenEffects>
+            </a:ext>
+          </a:extLst>
+        </p:spPr>
+      </p:pic>
+      <p:sp>
+        <p:nvSpPr>
+          <p:cNvPr id="5" name="TextBox 4"/>
+          <p:cNvSpPr txBox="1"/>
+          <p:nvPr/>
+        </p:nvSpPr>
+        <p:spPr>
+          <a:xfrm>
+            <a:off x="5652120" y="6062511"/>
+            <a:ext cx="1677062" cy="215444"/>
+          </a:xfrm>
+          <a:prstGeom prst="rect">
+            <a:avLst/>
+          </a:prstGeom>
+          <a:noFill/>
+        </p:spPr>
+        <p:txBody>
+          <a:bodyPr wrap="none" rtlCol="0">
+            <a:spAutoFit/>
+          </a:bodyPr>
+          <a:lstStyle/>
+          <a:p>
+            <a:r>
+              <a:rPr lang="de-DE" sz="800" dirty="0" smtClean="0"/>
+              <a:t>Quelle: Johnston, Wayte, Spikes</a:t>
+            </a:r>
+            <a:endParaRPr lang="de-DE" sz="800" dirty="0"/>
+          </a:p>
+        </p:txBody>
+      </p:sp>
+    </p:spTree>
+    <p:extLst>
+      <p:ext uri="{BB962C8B-B14F-4D97-AF65-F5344CB8AC3E}">
+        <p14:creationId xmlns:p14="http://schemas.microsoft.com/office/powerpoint/2010/main" val="955178623"/>
+      </p:ext>
+    </p:extLst>
+  </p:cSld>
+  <p:clrMapOvr>
+    <a:masterClrMapping/>
+  </p:clrMapOvr>
+  <p:timing>
+    <p:tnLst>
+      <p:par>
+        <p:cTn id="1" dur="indefinite" restart="never" nodeType="tmRoot"/>
+      </p:par>
+    </p:tnLst>
+  </p:timing>
+</p:sld>
+</file>
+
+<file path=ppt/slides/slide8.xml><?xml version="1.0" encoding="utf-8"?>
 <p:sld xmlns:a="http://schemas.openxmlformats.org/drawingml/2006/main" xmlns:r="http://schemas.openxmlformats.org/officeDocument/2006/relationships" xmlns:p="http://schemas.openxmlformats.org/presentationml/2006/main">
   <p:cSld>
     <p:spTree>
@@ -6226,6 +6961,318 @@
           </a:extLst>
         </p:spPr>
       </p:pic>
+      <p:sp>
+        <p:nvSpPr>
+          <p:cNvPr id="3" name="TextBox 2"/>
+          <p:cNvSpPr txBox="1"/>
+          <p:nvPr/>
+        </p:nvSpPr>
+        <p:spPr>
+          <a:xfrm>
+            <a:off x="4031940" y="6244232"/>
+            <a:ext cx="752129" cy="215444"/>
+          </a:xfrm>
+          <a:prstGeom prst="rect">
+            <a:avLst/>
+          </a:prstGeom>
+          <a:noFill/>
+        </p:spPr>
+        <p:txBody>
+          <a:bodyPr wrap="none" rtlCol="0">
+            <a:spAutoFit/>
+          </a:bodyPr>
+          <a:lstStyle/>
+          <a:p>
+            <a:r>
+              <a:rPr lang="de-DE" sz="800" dirty="0" smtClean="0"/>
+              <a:t>Quelle: PCS</a:t>
+            </a:r>
+            <a:endParaRPr lang="de-DE" sz="800" dirty="0"/>
+          </a:p>
+        </p:txBody>
+      </p:sp>
+      <p:sp>
+        <p:nvSpPr>
+          <p:cNvPr id="4" name="Rectangle 3"/>
+          <p:cNvSpPr/>
+          <p:nvPr/>
+        </p:nvSpPr>
+        <p:spPr bwMode="auto">
+          <a:xfrm>
+            <a:off x="3383868" y="1772816"/>
+            <a:ext cx="2016224" cy="900100"/>
+          </a:xfrm>
+          <a:prstGeom prst="rect">
+            <a:avLst/>
+          </a:prstGeom>
+          <a:solidFill>
+            <a:schemeClr val="bg1"/>
+          </a:solidFill>
+          <a:ln w="9525" cap="flat" cmpd="sng" algn="ctr">
+            <a:solidFill>
+              <a:schemeClr val="bg1"/>
+            </a:solidFill>
+            <a:prstDash val="solid"/>
+            <a:round/>
+            <a:headEnd type="none" w="med" len="med"/>
+            <a:tailEnd type="none" w="med" len="med"/>
+          </a:ln>
+          <a:effectLst/>
+          <a:extLst/>
+        </p:spPr>
+        <p:txBody>
+          <a:bodyPr vert="horz" wrap="square" lIns="91440" tIns="45720" rIns="91440" bIns="45720" numCol="1" rtlCol="0" anchor="t" anchorCtr="0" compatLnSpc="1">
+            <a:prstTxWarp prst="textNoShape">
+              <a:avLst/>
+            </a:prstTxWarp>
+          </a:bodyPr>
+          <a:lstStyle/>
+          <a:p>
+            <a:pPr marL="0" marR="0" indent="0" algn="l" defTabSz="914400" rtl="0" eaLnBrk="0" fontAlgn="base" latinLnBrk="0" hangingPunct="0">
+              <a:lnSpc>
+                <a:spcPct val="100000"/>
+              </a:lnSpc>
+              <a:spcBef>
+                <a:spcPct val="0"/>
+              </a:spcBef>
+              <a:spcAft>
+                <a:spcPct val="0"/>
+              </a:spcAft>
+              <a:buClrTx/>
+              <a:buSzTx/>
+              <a:buFontTx/>
+              <a:buNone/>
+              <a:tabLst/>
+            </a:pPr>
+            <a:endParaRPr kumimoji="0" lang="de-DE" sz="2400" b="1" i="0" u="none" strike="noStrike" normalizeH="0" baseline="0" smtClean="0">
+              <a:ln w="12700">
+                <a:solidFill>
+                  <a:schemeClr val="tx2">
+                    <a:satMod val="155000"/>
+                  </a:schemeClr>
+                </a:solidFill>
+                <a:prstDash val="solid"/>
+              </a:ln>
+              <a:solidFill>
+                <a:schemeClr val="bg2">
+                  <a:tint val="85000"/>
+                  <a:satMod val="155000"/>
+                </a:schemeClr>
+              </a:solidFill>
+              <a:effectLst>
+                <a:outerShdw blurRad="41275" dist="20320" dir="1800000" algn="tl" rotWithShape="0">
+                  <a:srgbClr val="000000">
+                    <a:alpha val="40000"/>
+                  </a:srgbClr>
+                </a:outerShdw>
+              </a:effectLst>
+              <a:latin typeface="Arial" charset="0"/>
+              <a:ea typeface="ＭＳ Ｐゴシック" pitchFamily="1" charset="-128"/>
+            </a:endParaRPr>
+          </a:p>
+        </p:txBody>
+      </p:sp>
+      <p:sp>
+        <p:nvSpPr>
+          <p:cNvPr id="6" name="Rectangle 5"/>
+          <p:cNvSpPr/>
+          <p:nvPr/>
+        </p:nvSpPr>
+        <p:spPr bwMode="auto">
+          <a:xfrm>
+            <a:off x="3599892" y="4473116"/>
+            <a:ext cx="1620180" cy="468052"/>
+          </a:xfrm>
+          <a:prstGeom prst="rect">
+            <a:avLst/>
+          </a:prstGeom>
+          <a:solidFill>
+            <a:schemeClr val="bg1"/>
+          </a:solidFill>
+          <a:ln w="9525" cap="flat" cmpd="sng" algn="ctr">
+            <a:solidFill>
+              <a:schemeClr val="bg1"/>
+            </a:solidFill>
+            <a:prstDash val="solid"/>
+            <a:round/>
+            <a:headEnd type="none" w="med" len="med"/>
+            <a:tailEnd type="none" w="med" len="med"/>
+          </a:ln>
+          <a:effectLst/>
+          <a:extLst/>
+        </p:spPr>
+        <p:txBody>
+          <a:bodyPr vert="horz" wrap="square" lIns="91440" tIns="45720" rIns="91440" bIns="45720" numCol="1" rtlCol="0" anchor="t" anchorCtr="0" compatLnSpc="1">
+            <a:prstTxWarp prst="textNoShape">
+              <a:avLst/>
+            </a:prstTxWarp>
+          </a:bodyPr>
+          <a:lstStyle/>
+          <a:p>
+            <a:pPr marL="0" marR="0" indent="0" algn="l" defTabSz="914400" rtl="0" eaLnBrk="0" fontAlgn="base" latinLnBrk="0" hangingPunct="0">
+              <a:lnSpc>
+                <a:spcPct val="100000"/>
+              </a:lnSpc>
+              <a:spcBef>
+                <a:spcPct val="0"/>
+              </a:spcBef>
+              <a:spcAft>
+                <a:spcPct val="0"/>
+              </a:spcAft>
+              <a:buClrTx/>
+              <a:buSzTx/>
+              <a:buFontTx/>
+              <a:buNone/>
+              <a:tabLst/>
+            </a:pPr>
+            <a:endParaRPr kumimoji="0" lang="de-DE" sz="2400" b="0" i="0" u="none" strike="noStrike" cap="none" normalizeH="0" baseline="0" smtClean="0">
+              <a:ln>
+                <a:noFill/>
+              </a:ln>
+              <a:solidFill>
+                <a:schemeClr val="tx1"/>
+              </a:solidFill>
+              <a:effectLst/>
+              <a:latin typeface="Arial" charset="0"/>
+              <a:ea typeface="ＭＳ Ｐゴシック" pitchFamily="1" charset="-128"/>
+            </a:endParaRPr>
+          </a:p>
+        </p:txBody>
+      </p:sp>
+      <p:sp>
+        <p:nvSpPr>
+          <p:cNvPr id="7" name="Rectangle 6"/>
+          <p:cNvSpPr/>
+          <p:nvPr/>
+        </p:nvSpPr>
+        <p:spPr bwMode="auto">
+          <a:xfrm>
+            <a:off x="4409982" y="4941168"/>
+            <a:ext cx="1566174" cy="648072"/>
+          </a:xfrm>
+          <a:prstGeom prst="rect">
+            <a:avLst/>
+          </a:prstGeom>
+          <a:solidFill>
+            <a:schemeClr val="bg1"/>
+          </a:solidFill>
+          <a:ln w="9525" cap="flat" cmpd="sng" algn="ctr">
+            <a:solidFill>
+              <a:schemeClr val="bg1"/>
+            </a:solidFill>
+            <a:prstDash val="solid"/>
+            <a:round/>
+            <a:headEnd type="none" w="med" len="med"/>
+            <a:tailEnd type="none" w="med" len="med"/>
+          </a:ln>
+          <a:effectLst/>
+          <a:extLst/>
+        </p:spPr>
+        <p:txBody>
+          <a:bodyPr vert="horz" wrap="square" lIns="91440" tIns="45720" rIns="91440" bIns="45720" numCol="1" rtlCol="0" anchor="t" anchorCtr="0" compatLnSpc="1">
+            <a:prstTxWarp prst="textNoShape">
+              <a:avLst/>
+            </a:prstTxWarp>
+          </a:bodyPr>
+          <a:lstStyle/>
+          <a:p>
+            <a:pPr marL="0" marR="0" indent="0" algn="l" defTabSz="914400" rtl="0" eaLnBrk="0" fontAlgn="base" latinLnBrk="0" hangingPunct="0">
+              <a:lnSpc>
+                <a:spcPct val="100000"/>
+              </a:lnSpc>
+              <a:spcBef>
+                <a:spcPct val="0"/>
+              </a:spcBef>
+              <a:spcAft>
+                <a:spcPct val="0"/>
+              </a:spcAft>
+              <a:buClrTx/>
+              <a:buSzTx/>
+              <a:buFontTx/>
+              <a:buNone/>
+              <a:tabLst/>
+            </a:pPr>
+            <a:endParaRPr kumimoji="0" lang="de-DE" sz="2400" b="0" i="0" u="none" strike="noStrike" cap="none" normalizeH="0" baseline="0" smtClean="0">
+              <a:ln>
+                <a:noFill/>
+              </a:ln>
+              <a:solidFill>
+                <a:schemeClr val="tx1"/>
+              </a:solidFill>
+              <a:effectLst/>
+              <a:latin typeface="Arial" charset="0"/>
+              <a:ea typeface="ＭＳ Ｐゴシック" pitchFamily="1" charset="-128"/>
+            </a:endParaRPr>
+          </a:p>
+        </p:txBody>
+      </p:sp>
+      <p:sp>
+        <p:nvSpPr>
+          <p:cNvPr id="8" name="Rectangle 7"/>
+          <p:cNvSpPr/>
+          <p:nvPr/>
+        </p:nvSpPr>
+        <p:spPr bwMode="auto">
+          <a:xfrm>
+            <a:off x="5112060" y="3392996"/>
+            <a:ext cx="2412268" cy="468052"/>
+          </a:xfrm>
+          <a:prstGeom prst="rect">
+            <a:avLst/>
+          </a:prstGeom>
+          <a:solidFill>
+            <a:schemeClr val="bg1"/>
+          </a:solidFill>
+          <a:ln w="9525" cap="flat" cmpd="sng" algn="ctr">
+            <a:solidFill>
+              <a:schemeClr val="bg1"/>
+            </a:solidFill>
+            <a:prstDash val="solid"/>
+            <a:round/>
+            <a:headEnd type="none" w="med" len="med"/>
+            <a:tailEnd type="none" w="med" len="med"/>
+          </a:ln>
+          <a:effectLst/>
+          <a:extLst/>
+        </p:spPr>
+        <p:txBody>
+          <a:bodyPr vert="horz" wrap="square" lIns="91440" tIns="45720" rIns="91440" bIns="45720" numCol="1" rtlCol="0" anchor="t" anchorCtr="0" compatLnSpc="1">
+            <a:prstTxWarp prst="textNoShape">
+              <a:avLst/>
+            </a:prstTxWarp>
+          </a:bodyPr>
+          <a:lstStyle/>
+          <a:p>
+            <a:pPr marL="0" marR="0" indent="0" algn="l" defTabSz="914400" rtl="0" eaLnBrk="0" fontAlgn="base" latinLnBrk="0" hangingPunct="0">
+              <a:lnSpc>
+                <a:spcPct val="100000"/>
+              </a:lnSpc>
+              <a:spcBef>
+                <a:spcPct val="0"/>
+              </a:spcBef>
+              <a:spcAft>
+                <a:spcPct val="0"/>
+              </a:spcAft>
+              <a:buClrTx/>
+              <a:buSzTx/>
+              <a:buFontTx/>
+              <a:buNone/>
+              <a:tabLst/>
+            </a:pPr>
+            <a:endParaRPr kumimoji="0" lang="de-DE" sz="2400" b="0" i="0" u="none" strike="noStrike" cap="none" normalizeH="0" baseline="0" smtClean="0">
+              <a:ln>
+                <a:noFill/>
+              </a:ln>
+              <a:solidFill>
+                <a:schemeClr val="tx1"/>
+              </a:solidFill>
+              <a:effectLst/>
+              <a:latin typeface="Arial" charset="0"/>
+              <a:ea typeface="ＭＳ Ｐゴシック" pitchFamily="1" charset="-128"/>
+            </a:endParaRPr>
+          </a:p>
+        </p:txBody>
+      </p:sp>
     </p:spTree>
     <p:extLst>
       <p:ext uri="{BB962C8B-B14F-4D97-AF65-F5344CB8AC3E}">
@@ -6246,7 +7293,7 @@
 </p:sld>
 </file>
 
-<file path=ppt/slides/slide8.xml><?xml version="1.0" encoding="utf-8"?>
+<file path=ppt/slides/slide9.xml><?xml version="1.0" encoding="utf-8"?>
 <p:sld xmlns:a="http://schemas.openxmlformats.org/drawingml/2006/main" xmlns:r="http://schemas.openxmlformats.org/officeDocument/2006/relationships" xmlns:p="http://schemas.openxmlformats.org/presentationml/2006/main">
   <p:cSld>
     <p:spTree>
@@ -6471,175 +7518,16 @@
           </a:p>
         </p:txBody>
       </p:sp>
-    </p:spTree>
-    <p:extLst>
-      <p:ext uri="{BB962C8B-B14F-4D97-AF65-F5344CB8AC3E}">
-        <p14:creationId xmlns:p14="http://schemas.microsoft.com/office/powerpoint/2010/main" val="881018818"/>
-      </p:ext>
-    </p:extLst>
-  </p:cSld>
-  <p:clrMapOvr>
-    <a:masterClrMapping/>
-  </p:clrMapOvr>
-  <p:timing>
-    <p:tnLst>
-      <p:par>
-        <p:cTn id="1" dur="indefinite" restart="never" nodeType="tmRoot"/>
-      </p:par>
-    </p:tnLst>
-  </p:timing>
-</p:sld>
-</file>
-
-<file path=ppt/slides/slide9.xml><?xml version="1.0" encoding="utf-8"?>
-<p:sld xmlns:a="http://schemas.openxmlformats.org/drawingml/2006/main" xmlns:r="http://schemas.openxmlformats.org/officeDocument/2006/relationships" xmlns:p="http://schemas.openxmlformats.org/presentationml/2006/main">
-  <p:cSld>
-    <p:spTree>
-      <p:nvGrpSpPr>
-        <p:cNvPr id="1" name=""/>
-        <p:cNvGrpSpPr/>
-        <p:nvPr/>
-      </p:nvGrpSpPr>
-      <p:grpSpPr>
-        <a:xfrm>
-          <a:off x="0" y="0"/>
-          <a:ext cx="0" cy="0"/>
-          <a:chOff x="0" y="0"/>
-          <a:chExt cx="0" cy="0"/>
-        </a:xfrm>
-      </p:grpSpPr>
-      <p:pic>
-        <p:nvPicPr>
-          <p:cNvPr id="5122" name="Picture 2"/>
-          <p:cNvPicPr>
-            <a:picLocks noChangeAspect="1" noChangeArrowheads="1"/>
-          </p:cNvPicPr>
+      <p:sp>
+        <p:nvSpPr>
+          <p:cNvPr id="7" name="TextBox 6"/>
+          <p:cNvSpPr txBox="1"/>
           <p:nvPr/>
-        </p:nvPicPr>
-        <p:blipFill>
-          <a:blip r:embed="rId2">
-            <a:extLst>
-              <a:ext uri="{28A0092B-C50C-407E-A947-70E740481C1C}">
-                <a14:useLocalDpi xmlns:a14="http://schemas.microsoft.com/office/drawing/2010/main" val="0"/>
-              </a:ext>
-            </a:extLst>
-          </a:blip>
-          <a:srcRect/>
-          <a:stretch>
-            <a:fillRect/>
-          </a:stretch>
-        </p:blipFill>
-        <p:spPr bwMode="auto">
-          <a:xfrm>
-            <a:off x="539552" y="2132856"/>
-            <a:ext cx="8070044" cy="4283608"/>
-          </a:xfrm>
-          <a:prstGeom prst="rect">
-            <a:avLst/>
-          </a:prstGeom>
-          <a:noFill/>
-          <a:ln>
-            <a:noFill/>
-          </a:ln>
-          <a:effectLst/>
-          <a:extLst>
-            <a:ext uri="{909E8E84-426E-40DD-AFC4-6F175D3DCCD1}">
-              <a14:hiddenFill xmlns:a14="http://schemas.microsoft.com/office/drawing/2010/main">
-                <a:solidFill>
-                  <a:schemeClr val="accent1"/>
-                </a:solidFill>
-              </a14:hiddenFill>
-            </a:ext>
-            <a:ext uri="{91240B29-F687-4F45-9708-019B960494DF}">
-              <a14:hiddenLine xmlns:a14="http://schemas.microsoft.com/office/drawing/2010/main" w="9525">
-                <a:solidFill>
-                  <a:schemeClr val="tx1"/>
-                </a:solidFill>
-                <a:miter lim="800000"/>
-                <a:headEnd/>
-                <a:tailEnd/>
-              </a14:hiddenLine>
-            </a:ext>
-            <a:ext uri="{AF507438-7753-43E0-B8FC-AC1667EBCBE1}">
-              <a14:hiddenEffects xmlns:a14="http://schemas.microsoft.com/office/drawing/2010/main">
-                <a:effectLst>
-                  <a:outerShdw dist="35921" dir="2700000" algn="ctr" rotWithShape="0">
-                    <a:schemeClr val="bg2"/>
-                  </a:outerShdw>
-                </a:effectLst>
-              </a14:hiddenEffects>
-            </a:ext>
-          </a:extLst>
-        </p:spPr>
-      </p:pic>
-      <p:sp>
-        <p:nvSpPr>
-          <p:cNvPr id="2" name="Title 1"/>
-          <p:cNvSpPr>
-            <a:spLocks noGrp="1"/>
-          </p:cNvSpPr>
-          <p:nvPr>
-            <p:ph type="title"/>
-          </p:nvPr>
-        </p:nvSpPr>
-        <p:spPr/>
-        <p:txBody>
-          <a:bodyPr/>
-          <a:lstStyle/>
-          <a:p>
-            <a:r>
-              <a:rPr lang="de-DE" dirty="0" smtClean="0"/>
-              <a:t>Elektrische Methode</a:t>
-            </a:r>
-            <a:endParaRPr lang="de-DE" dirty="0"/>
-          </a:p>
-        </p:txBody>
-      </p:sp>
-      <p:sp>
-        <p:nvSpPr>
-          <p:cNvPr id="3" name="Content Placeholder 2"/>
-          <p:cNvSpPr>
-            <a:spLocks noGrp="1"/>
-          </p:cNvSpPr>
-          <p:nvPr>
-            <p:ph idx="1"/>
-          </p:nvPr>
         </p:nvSpPr>
         <p:spPr>
           <a:xfrm>
-            <a:off x="457200" y="1600201"/>
-            <a:ext cx="8229600" cy="1108720"/>
-          </a:xfrm>
-        </p:spPr>
-        <p:txBody>
-          <a:bodyPr>
-            <a:normAutofit/>
-          </a:bodyPr>
-          <a:lstStyle/>
-          <a:p>
-            <a:r>
-              <a:rPr lang="de-DE" dirty="0" smtClean="0"/>
-              <a:t>Resistiv: metal-metal contact</a:t>
-            </a:r>
-          </a:p>
-          <a:p>
-            <a:r>
-              <a:rPr lang="de-DE" dirty="0" smtClean="0"/>
-              <a:t>Capacitive: seperation between surfaces</a:t>
-            </a:r>
-          </a:p>
-        </p:txBody>
-      </p:sp>
-      <p:sp>
-        <p:nvSpPr>
-          <p:cNvPr id="4" name="TextBox 3"/>
-          <p:cNvSpPr txBox="1"/>
-          <p:nvPr/>
-        </p:nvSpPr>
-        <p:spPr>
-          <a:xfrm>
-            <a:off x="6339823" y="1800773"/>
-            <a:ext cx="2372637" cy="338554"/>
+            <a:off x="4164462" y="1233046"/>
+            <a:ext cx="752129" cy="215444"/>
           </a:xfrm>
           <a:prstGeom prst="rect">
             <a:avLst/>
@@ -6653,17 +7541,17 @@
           <a:lstStyle/>
           <a:p>
             <a:r>
-              <a:rPr lang="en-US" sz="1600" dirty="0" smtClean="0"/>
-              <a:t>Voltage discharge curve</a:t>
-            </a:r>
-            <a:endParaRPr lang="de-DE" sz="1600" dirty="0"/>
+              <a:rPr lang="de-DE" sz="800" dirty="0" smtClean="0"/>
+              <a:t>Quelle: PCS</a:t>
+            </a:r>
+            <a:endParaRPr lang="de-DE" sz="800" dirty="0"/>
           </a:p>
         </p:txBody>
       </p:sp>
     </p:spTree>
     <p:extLst>
       <p:ext uri="{BB962C8B-B14F-4D97-AF65-F5344CB8AC3E}">
-        <p14:creationId xmlns:p14="http://schemas.microsoft.com/office/powerpoint/2010/main" val="100685475"/>
+        <p14:creationId xmlns:p14="http://schemas.microsoft.com/office/powerpoint/2010/main" val="881018818"/>
       </p:ext>
     </p:extLst>
   </p:cSld>

</xml_diff>